<commit_message>
Ajeitei uns detalhes no slide
</commit_message>
<xml_diff>
--- a/Apresentação/Vila do Chaves.pptx
+++ b/Apresentação/Vila do Chaves.pptx
@@ -434,7 +434,7 @@
         </p:spPr>
         <p:txBody>
           <a:bodyPr bIns="91425" rIns="91425" lIns="91425" tIns="91425" anchor="ctr" anchorCtr="0">
-            <a:normAutofit/>
+            <a:noAutofit/>
           </a:bodyPr>
           <a:lstStyle/>
           <a:p>
@@ -539,7 +539,7 @@
         </p:spPr>
         <p:txBody>
           <a:bodyPr bIns="91425" rIns="91425" lIns="91425" tIns="91425" anchor="ctr" anchorCtr="0">
-            <a:normAutofit/>
+            <a:noAutofit/>
           </a:bodyPr>
           <a:lstStyle/>
           <a:p>
@@ -688,7 +688,7 @@
         </p:spPr>
         <p:txBody>
           <a:bodyPr bIns="91425" rIns="91425" lIns="91425" tIns="91425" anchor="t" anchorCtr="0">
-            <a:normAutofit/>
+            <a:noAutofit/>
           </a:bodyPr>
           <a:lstStyle/>
           <a:p>
@@ -718,7 +718,7 @@
   <p:cSld>
     <p:spTree>
       <p:nvGrpSpPr>
-        <p:cNvPr id="129" name="Shape 129"/>
+        <p:cNvPr id="128" name="Shape 128"/>
         <p:cNvGrpSpPr/>
         <p:nvPr/>
       </p:nvGrpSpPr>
@@ -732,7 +732,7 @@
       </p:grpSpPr>
       <p:sp>
         <p:nvSpPr>
-          <p:cNvPr id="130" name="Shape 130"/>
+          <p:cNvPr id="129" name="Shape 129"/>
           <p:cNvSpPr/>
           <p:nvPr>
             <p:ph idx="2" type="sldImg"/>
@@ -776,7 +776,7 @@
       </p:sp>
       <p:sp>
         <p:nvSpPr>
-          <p:cNvPr id="131" name="Shape 131"/>
+          <p:cNvPr id="130" name="Shape 130"/>
           <p:cNvSpPr txBox="1"/>
           <p:nvPr>
             <p:ph idx="1" type="body"/>
@@ -793,7 +793,7 @@
         </p:spPr>
         <p:txBody>
           <a:bodyPr bIns="91425" rIns="91425" lIns="91425" tIns="91425" anchor="t" anchorCtr="0">
-            <a:normAutofit/>
+            <a:noAutofit/>
           </a:bodyPr>
           <a:lstStyle/>
           <a:p>
@@ -823,7 +823,7 @@
   <p:cSld>
     <p:spTree>
       <p:nvGrpSpPr>
-        <p:cNvPr id="136" name="Shape 136"/>
+        <p:cNvPr id="135" name="Shape 135"/>
         <p:cNvGrpSpPr/>
         <p:nvPr/>
       </p:nvGrpSpPr>
@@ -837,7 +837,7 @@
       </p:grpSpPr>
       <p:sp>
         <p:nvSpPr>
-          <p:cNvPr id="137" name="Shape 137"/>
+          <p:cNvPr id="136" name="Shape 136"/>
           <p:cNvSpPr/>
           <p:nvPr>
             <p:ph idx="2" type="sldImg"/>
@@ -881,7 +881,7 @@
       </p:sp>
       <p:sp>
         <p:nvSpPr>
-          <p:cNvPr id="138" name="Shape 138"/>
+          <p:cNvPr id="137" name="Shape 137"/>
           <p:cNvSpPr txBox="1"/>
           <p:nvPr>
             <p:ph idx="1" type="body"/>
@@ -898,7 +898,7 @@
         </p:spPr>
         <p:txBody>
           <a:bodyPr bIns="91425" rIns="91425" lIns="91425" tIns="91425" anchor="t" anchorCtr="0">
-            <a:normAutofit/>
+            <a:noAutofit/>
           </a:bodyPr>
           <a:lstStyle/>
           <a:p>
@@ -928,7 +928,7 @@
   <p:cSld>
     <p:spTree>
       <p:nvGrpSpPr>
-        <p:cNvPr id="143" name="Shape 143"/>
+        <p:cNvPr id="142" name="Shape 142"/>
         <p:cNvGrpSpPr/>
         <p:nvPr/>
       </p:nvGrpSpPr>
@@ -942,7 +942,7 @@
       </p:grpSpPr>
       <p:sp>
         <p:nvSpPr>
-          <p:cNvPr id="144" name="Shape 144"/>
+          <p:cNvPr id="143" name="Shape 143"/>
           <p:cNvSpPr/>
           <p:nvPr>
             <p:ph idx="2" type="sldImg"/>
@@ -986,7 +986,7 @@
       </p:sp>
       <p:sp>
         <p:nvSpPr>
-          <p:cNvPr id="145" name="Shape 145"/>
+          <p:cNvPr id="144" name="Shape 144"/>
           <p:cNvSpPr txBox="1"/>
           <p:nvPr>
             <p:ph idx="1" type="body"/>
@@ -1003,7 +1003,7 @@
         </p:spPr>
         <p:txBody>
           <a:bodyPr bIns="91425" rIns="91425" lIns="91425" tIns="91425" anchor="t" anchorCtr="0">
-            <a:normAutofit/>
+            <a:noAutofit/>
           </a:bodyPr>
           <a:lstStyle/>
           <a:p>
@@ -1033,7 +1033,7 @@
   <p:cSld>
     <p:spTree>
       <p:nvGrpSpPr>
-        <p:cNvPr id="149" name="Shape 149"/>
+        <p:cNvPr id="148" name="Shape 148"/>
         <p:cNvGrpSpPr/>
         <p:nvPr/>
       </p:nvGrpSpPr>
@@ -1047,7 +1047,7 @@
       </p:grpSpPr>
       <p:sp>
         <p:nvSpPr>
-          <p:cNvPr id="150" name="Shape 150"/>
+          <p:cNvPr id="149" name="Shape 149"/>
           <p:cNvSpPr/>
           <p:nvPr>
             <p:ph idx="2" type="sldImg"/>
@@ -1091,7 +1091,7 @@
       </p:sp>
       <p:sp>
         <p:nvSpPr>
-          <p:cNvPr id="151" name="Shape 151"/>
+          <p:cNvPr id="150" name="Shape 150"/>
           <p:cNvSpPr txBox="1"/>
           <p:nvPr>
             <p:ph idx="1" type="body"/>
@@ -1108,7 +1108,7 @@
         </p:spPr>
         <p:txBody>
           <a:bodyPr bIns="91425" rIns="91425" lIns="91425" tIns="91425" anchor="t" anchorCtr="0">
-            <a:normAutofit/>
+            <a:noAutofit/>
           </a:bodyPr>
           <a:lstStyle/>
           <a:p>
@@ -1138,7 +1138,7 @@
   <p:cSld>
     <p:spTree>
       <p:nvGrpSpPr>
-        <p:cNvPr id="156" name="Shape 156"/>
+        <p:cNvPr id="155" name="Shape 155"/>
         <p:cNvGrpSpPr/>
         <p:nvPr/>
       </p:nvGrpSpPr>
@@ -1152,7 +1152,7 @@
       </p:grpSpPr>
       <p:sp>
         <p:nvSpPr>
-          <p:cNvPr id="157" name="Shape 157"/>
+          <p:cNvPr id="156" name="Shape 156"/>
           <p:cNvSpPr txBox="1"/>
           <p:nvPr>
             <p:ph idx="1" type="body"/>
@@ -1169,7 +1169,7 @@
         </p:spPr>
         <p:txBody>
           <a:bodyPr bIns="91425" rIns="91425" lIns="91425" tIns="91425" anchor="ctr" anchorCtr="0">
-            <a:normAutofit/>
+            <a:noAutofit/>
           </a:bodyPr>
           <a:lstStyle/>
           <a:p>
@@ -1188,7 +1188,7 @@
       </p:sp>
       <p:sp>
         <p:nvSpPr>
-          <p:cNvPr id="158" name="Shape 158"/>
+          <p:cNvPr id="157" name="Shape 157"/>
           <p:cNvSpPr/>
           <p:nvPr>
             <p:ph idx="2" type="sldImg"/>
@@ -1243,7 +1243,7 @@
   <p:cSld>
     <p:spTree>
       <p:nvGrpSpPr>
-        <p:cNvPr id="162" name="Shape 162"/>
+        <p:cNvPr id="161" name="Shape 161"/>
         <p:cNvGrpSpPr/>
         <p:nvPr/>
       </p:nvGrpSpPr>
@@ -1257,7 +1257,7 @@
       </p:grpSpPr>
       <p:sp>
         <p:nvSpPr>
-          <p:cNvPr id="163" name="Shape 163"/>
+          <p:cNvPr id="162" name="Shape 162"/>
           <p:cNvSpPr/>
           <p:nvPr>
             <p:ph idx="2" type="sldImg"/>
@@ -1301,7 +1301,7 @@
       </p:sp>
       <p:sp>
         <p:nvSpPr>
-          <p:cNvPr id="164" name="Shape 164"/>
+          <p:cNvPr id="163" name="Shape 163"/>
           <p:cNvSpPr txBox="1"/>
           <p:nvPr>
             <p:ph idx="1" type="body"/>
@@ -1318,7 +1318,7 @@
         </p:spPr>
         <p:txBody>
           <a:bodyPr bIns="91425" rIns="91425" lIns="91425" tIns="91425" anchor="t" anchorCtr="0">
-            <a:normAutofit/>
+            <a:noAutofit/>
           </a:bodyPr>
           <a:lstStyle/>
           <a:p>
@@ -1348,7 +1348,7 @@
   <p:cSld>
     <p:spTree>
       <p:nvGrpSpPr>
-        <p:cNvPr id="168" name="Shape 168"/>
+        <p:cNvPr id="167" name="Shape 167"/>
         <p:cNvGrpSpPr/>
         <p:nvPr/>
       </p:nvGrpSpPr>
@@ -1362,7 +1362,7 @@
       </p:grpSpPr>
       <p:sp>
         <p:nvSpPr>
-          <p:cNvPr id="169" name="Shape 169"/>
+          <p:cNvPr id="168" name="Shape 168"/>
           <p:cNvSpPr txBox="1"/>
           <p:nvPr>
             <p:ph idx="1" type="body"/>
@@ -1379,7 +1379,7 @@
         </p:spPr>
         <p:txBody>
           <a:bodyPr bIns="91425" rIns="91425" lIns="91425" tIns="91425" anchor="ctr" anchorCtr="0">
-            <a:normAutofit/>
+            <a:noAutofit/>
           </a:bodyPr>
           <a:lstStyle/>
           <a:p>
@@ -1398,7 +1398,7 @@
       </p:sp>
       <p:sp>
         <p:nvSpPr>
-          <p:cNvPr id="170" name="Shape 170"/>
+          <p:cNvPr id="169" name="Shape 169"/>
           <p:cNvSpPr/>
           <p:nvPr>
             <p:ph idx="2" type="sldImg"/>
@@ -1453,7 +1453,7 @@
   <p:cSld>
     <p:spTree>
       <p:nvGrpSpPr>
-        <p:cNvPr id="174" name="Shape 174"/>
+        <p:cNvPr id="173" name="Shape 173"/>
         <p:cNvGrpSpPr/>
         <p:nvPr/>
       </p:nvGrpSpPr>
@@ -1467,7 +1467,7 @@
       </p:grpSpPr>
       <p:sp>
         <p:nvSpPr>
-          <p:cNvPr id="175" name="Shape 175"/>
+          <p:cNvPr id="174" name="Shape 174"/>
           <p:cNvSpPr txBox="1"/>
           <p:nvPr>
             <p:ph idx="1" type="body"/>
@@ -1484,7 +1484,7 @@
         </p:spPr>
         <p:txBody>
           <a:bodyPr bIns="91425" rIns="91425" lIns="91425" tIns="91425" anchor="ctr" anchorCtr="0">
-            <a:normAutofit/>
+            <a:noAutofit/>
           </a:bodyPr>
           <a:lstStyle/>
           <a:p>
@@ -1503,7 +1503,7 @@
       </p:sp>
       <p:sp>
         <p:nvSpPr>
-          <p:cNvPr id="176" name="Shape 176"/>
+          <p:cNvPr id="175" name="Shape 175"/>
           <p:cNvSpPr/>
           <p:nvPr>
             <p:ph idx="2" type="sldImg"/>
@@ -1589,7 +1589,7 @@
         </p:spPr>
         <p:txBody>
           <a:bodyPr bIns="91425" rIns="91425" lIns="91425" tIns="91425" anchor="ctr" anchorCtr="0">
-            <a:normAutofit/>
+            <a:noAutofit/>
           </a:bodyPr>
           <a:lstStyle/>
           <a:p>
@@ -1663,7 +1663,7 @@
   <p:cSld>
     <p:spTree>
       <p:nvGrpSpPr>
-        <p:cNvPr id="180" name="Shape 180"/>
+        <p:cNvPr id="179" name="Shape 179"/>
         <p:cNvGrpSpPr/>
         <p:nvPr/>
       </p:nvGrpSpPr>
@@ -1677,7 +1677,7 @@
       </p:grpSpPr>
       <p:sp>
         <p:nvSpPr>
-          <p:cNvPr id="181" name="Shape 181"/>
+          <p:cNvPr id="180" name="Shape 180"/>
           <p:cNvSpPr txBox="1"/>
           <p:nvPr>
             <p:ph idx="1" type="body"/>
@@ -1694,7 +1694,7 @@
         </p:spPr>
         <p:txBody>
           <a:bodyPr bIns="91425" rIns="91425" lIns="91425" tIns="91425" anchor="ctr" anchorCtr="0">
-            <a:normAutofit/>
+            <a:noAutofit/>
           </a:bodyPr>
           <a:lstStyle/>
           <a:p>
@@ -1713,7 +1713,7 @@
       </p:sp>
       <p:sp>
         <p:nvSpPr>
-          <p:cNvPr id="182" name="Shape 182"/>
+          <p:cNvPr id="181" name="Shape 181"/>
           <p:cNvSpPr/>
           <p:nvPr>
             <p:ph idx="2" type="sldImg"/>
@@ -1768,7 +1768,7 @@
   <p:cSld>
     <p:spTree>
       <p:nvGrpSpPr>
-        <p:cNvPr id="186" name="Shape 186"/>
+        <p:cNvPr id="185" name="Shape 185"/>
         <p:cNvGrpSpPr/>
         <p:nvPr/>
       </p:nvGrpSpPr>
@@ -1782,7 +1782,7 @@
       </p:grpSpPr>
       <p:sp>
         <p:nvSpPr>
-          <p:cNvPr id="187" name="Shape 187"/>
+          <p:cNvPr id="186" name="Shape 186"/>
           <p:cNvSpPr/>
           <p:nvPr>
             <p:ph idx="2" type="sldImg"/>
@@ -1826,7 +1826,7 @@
       </p:sp>
       <p:sp>
         <p:nvSpPr>
-          <p:cNvPr id="188" name="Shape 188"/>
+          <p:cNvPr id="187" name="Shape 187"/>
           <p:cNvSpPr txBox="1"/>
           <p:nvPr>
             <p:ph idx="1" type="body"/>
@@ -1843,7 +1843,7 @@
         </p:spPr>
         <p:txBody>
           <a:bodyPr bIns="91425" rIns="91425" lIns="91425" tIns="91425" anchor="t" anchorCtr="0">
-            <a:normAutofit/>
+            <a:noAutofit/>
           </a:bodyPr>
           <a:lstStyle/>
           <a:p>
@@ -1873,7 +1873,7 @@
   <p:cSld>
     <p:spTree>
       <p:nvGrpSpPr>
-        <p:cNvPr id="192" name="Shape 192"/>
+        <p:cNvPr id="191" name="Shape 191"/>
         <p:cNvGrpSpPr/>
         <p:nvPr/>
       </p:nvGrpSpPr>
@@ -1887,7 +1887,7 @@
       </p:grpSpPr>
       <p:sp>
         <p:nvSpPr>
-          <p:cNvPr id="193" name="Shape 193"/>
+          <p:cNvPr id="192" name="Shape 192"/>
           <p:cNvSpPr/>
           <p:nvPr>
             <p:ph idx="2" type="sldImg"/>
@@ -1931,7 +1931,7 @@
       </p:sp>
       <p:sp>
         <p:nvSpPr>
-          <p:cNvPr id="194" name="Shape 194"/>
+          <p:cNvPr id="193" name="Shape 193"/>
           <p:cNvSpPr txBox="1"/>
           <p:nvPr>
             <p:ph idx="1" type="body"/>
@@ -1948,7 +1948,7 @@
         </p:spPr>
         <p:txBody>
           <a:bodyPr bIns="91425" rIns="91425" lIns="91425" tIns="91425" anchor="t" anchorCtr="0">
-            <a:normAutofit/>
+            <a:noAutofit/>
           </a:bodyPr>
           <a:lstStyle/>
           <a:p>
@@ -1978,7 +1978,7 @@
   <p:cSld>
     <p:spTree>
       <p:nvGrpSpPr>
-        <p:cNvPr id="198" name="Shape 198"/>
+        <p:cNvPr id="197" name="Shape 197"/>
         <p:cNvGrpSpPr/>
         <p:nvPr/>
       </p:nvGrpSpPr>
@@ -1992,7 +1992,7 @@
       </p:grpSpPr>
       <p:sp>
         <p:nvSpPr>
-          <p:cNvPr id="199" name="Shape 199"/>
+          <p:cNvPr id="198" name="Shape 198"/>
           <p:cNvSpPr txBox="1"/>
           <p:nvPr>
             <p:ph idx="1" type="body"/>
@@ -2009,7 +2009,7 @@
         </p:spPr>
         <p:txBody>
           <a:bodyPr bIns="91425" rIns="91425" lIns="91425" tIns="91425" anchor="ctr" anchorCtr="0">
-            <a:normAutofit/>
+            <a:noAutofit/>
           </a:bodyPr>
           <a:lstStyle/>
           <a:p>
@@ -2028,7 +2028,7 @@
       </p:sp>
       <p:sp>
         <p:nvSpPr>
-          <p:cNvPr id="200" name="Shape 200"/>
+          <p:cNvPr id="199" name="Shape 199"/>
           <p:cNvSpPr/>
           <p:nvPr>
             <p:ph idx="2" type="sldImg"/>
@@ -2083,7 +2083,7 @@
   <p:cSld>
     <p:spTree>
       <p:nvGrpSpPr>
-        <p:cNvPr id="204" name="Shape 204"/>
+        <p:cNvPr id="203" name="Shape 203"/>
         <p:cNvGrpSpPr/>
         <p:nvPr/>
       </p:nvGrpSpPr>
@@ -2097,7 +2097,7 @@
       </p:grpSpPr>
       <p:sp>
         <p:nvSpPr>
-          <p:cNvPr id="205" name="Shape 205"/>
+          <p:cNvPr id="204" name="Shape 204"/>
           <p:cNvSpPr txBox="1"/>
           <p:nvPr>
             <p:ph idx="1" type="body"/>
@@ -2114,7 +2114,7 @@
         </p:spPr>
         <p:txBody>
           <a:bodyPr bIns="91425" rIns="91425" lIns="91425" tIns="91425" anchor="ctr" anchorCtr="0">
-            <a:normAutofit/>
+            <a:noAutofit/>
           </a:bodyPr>
           <a:lstStyle/>
           <a:p>
@@ -2133,7 +2133,7 @@
       </p:sp>
       <p:sp>
         <p:nvSpPr>
-          <p:cNvPr id="206" name="Shape 206"/>
+          <p:cNvPr id="205" name="Shape 205"/>
           <p:cNvSpPr/>
           <p:nvPr>
             <p:ph idx="2" type="sldImg"/>
@@ -2219,7 +2219,7 @@
         </p:spPr>
         <p:txBody>
           <a:bodyPr bIns="91425" rIns="91425" lIns="91425" tIns="91425" anchor="ctr" anchorCtr="0">
-            <a:normAutofit/>
+            <a:noAutofit/>
           </a:bodyPr>
           <a:lstStyle/>
           <a:p>
@@ -2324,7 +2324,7 @@
         </p:spPr>
         <p:txBody>
           <a:bodyPr bIns="91425" rIns="91425" lIns="91425" tIns="91425" anchor="ctr" anchorCtr="0">
-            <a:normAutofit/>
+            <a:noAutofit/>
           </a:bodyPr>
           <a:lstStyle/>
           <a:p>
@@ -2429,7 +2429,7 @@
         </p:spPr>
         <p:txBody>
           <a:bodyPr bIns="91425" rIns="91425" lIns="91425" tIns="91425" anchor="ctr" anchorCtr="0">
-            <a:normAutofit/>
+            <a:noAutofit/>
           </a:bodyPr>
           <a:lstStyle/>
           <a:p>
@@ -2534,7 +2534,7 @@
         </p:spPr>
         <p:txBody>
           <a:bodyPr bIns="91425" rIns="91425" lIns="91425" tIns="91425" anchor="ctr" anchorCtr="0">
-            <a:normAutofit/>
+            <a:noAutofit/>
           </a:bodyPr>
           <a:lstStyle/>
           <a:p>
@@ -2683,7 +2683,7 @@
         </p:spPr>
         <p:txBody>
           <a:bodyPr bIns="91425" rIns="91425" lIns="91425" tIns="91425" anchor="t" anchorCtr="0">
-            <a:normAutofit/>
+            <a:noAutofit/>
           </a:bodyPr>
           <a:lstStyle/>
           <a:p>
@@ -2788,7 +2788,7 @@
         </p:spPr>
         <p:txBody>
           <a:bodyPr bIns="91425" rIns="91425" lIns="91425" tIns="91425" anchor="t" anchorCtr="0">
-            <a:normAutofit/>
+            <a:noAutofit/>
           </a:bodyPr>
           <a:lstStyle/>
           <a:p>
@@ -2893,7 +2893,7 @@
         </p:spPr>
         <p:txBody>
           <a:bodyPr bIns="91425" rIns="91425" lIns="91425" tIns="91425" anchor="t" anchorCtr="0">
-            <a:normAutofit/>
+            <a:noAutofit/>
           </a:bodyPr>
           <a:lstStyle/>
           <a:p>
@@ -2966,7 +2966,7 @@
         </p:spPr>
         <p:txBody>
           <a:bodyPr bIns="45700" rIns="91425" lIns="91425" tIns="45700" anchor="ctr" anchorCtr="0">
-            <a:normAutofit/>
+            <a:noAutofit/>
           </a:bodyPr>
           <a:lstStyle/>
           <a:p>
@@ -3047,7 +3047,7 @@
         </p:spPr>
         <p:txBody>
           <a:bodyPr bIns="45700" rIns="91425" lIns="91425" tIns="45700" anchor="ctr" anchorCtr="0">
-            <a:normAutofit/>
+            <a:noAutofit/>
           </a:bodyPr>
           <a:lstStyle/>
           <a:p>
@@ -3128,7 +3128,7 @@
         </p:spPr>
         <p:txBody>
           <a:bodyPr bIns="45700" rIns="91425" lIns="91425" tIns="45700" anchor="b" anchorCtr="0">
-            <a:normAutofit/>
+            <a:noAutofit/>
           </a:bodyPr>
           <a:lstStyle/>
           <a:p>
@@ -3201,7 +3201,7 @@
         </p:spPr>
         <p:txBody>
           <a:bodyPr bIns="45700" rIns="91425" lIns="91425" tIns="45700" anchor="ctr" anchorCtr="0">
-            <a:normAutofit/>
+            <a:noAutofit/>
           </a:bodyPr>
           <a:lstStyle/>
           <a:p>
@@ -3274,7 +3274,7 @@
         </p:spPr>
         <p:txBody>
           <a:bodyPr bIns="45700" rIns="91425" lIns="91425" tIns="45700" anchor="ctr" anchorCtr="0">
-            <a:normAutofit/>
+            <a:noAutofit/>
           </a:bodyPr>
           <a:lstStyle/>
           <a:p>
@@ -3690,7 +3690,7 @@
         </p:spPr>
         <p:txBody>
           <a:bodyPr bIns="45700" rIns="91425" lIns="91425" tIns="45700" anchor="ctr" anchorCtr="0">
-            <a:normAutofit/>
+            <a:noAutofit/>
           </a:bodyPr>
           <a:lstStyle/>
           <a:p>
@@ -3851,7 +3851,7 @@
         </p:spPr>
         <p:txBody>
           <a:bodyPr bIns="45700" rIns="91425" lIns="91425" tIns="45700" anchor="ctr" anchorCtr="0">
-            <a:normAutofit/>
+            <a:noAutofit/>
           </a:bodyPr>
           <a:lstStyle/>
           <a:p>
@@ -3920,7 +3920,7 @@
         </p:spPr>
         <p:txBody>
           <a:bodyPr bIns="45700" rIns="91425" lIns="91425" tIns="45700" anchor="ctr" anchorCtr="0">
-            <a:normAutofit/>
+            <a:noAutofit/>
           </a:bodyPr>
           <a:lstStyle/>
           <a:p>
@@ -4106,7 +4106,7 @@
         </p:spPr>
         <p:txBody>
           <a:bodyPr bIns="45700" rIns="91425" lIns="91425" tIns="45700" anchor="ctr" anchorCtr="0">
-            <a:normAutofit/>
+            <a:noAutofit/>
           </a:bodyPr>
           <a:lstStyle/>
           <a:p>
@@ -4189,7 +4189,7 @@
         </p:spPr>
         <p:txBody>
           <a:bodyPr bIns="45700" rIns="91425" lIns="91425" tIns="45700" anchor="ctr" anchorCtr="0">
-            <a:normAutofit/>
+            <a:noAutofit/>
           </a:bodyPr>
           <a:lstStyle/>
           <a:p>
@@ -4258,7 +4258,7 @@
         </p:spPr>
         <p:txBody>
           <a:bodyPr bIns="45700" rIns="91425" lIns="91425" tIns="45700" anchor="ctr" anchorCtr="0">
-            <a:normAutofit/>
+            <a:noAutofit/>
           </a:bodyPr>
           <a:lstStyle/>
           <a:p>
@@ -4600,7 +4600,7 @@
         </p:spPr>
         <p:txBody>
           <a:bodyPr bIns="45700" rIns="91425" lIns="91425" tIns="45700" anchor="ctr" anchorCtr="0">
-            <a:normAutofit/>
+            <a:noAutofit/>
           </a:bodyPr>
           <a:lstStyle/>
           <a:p>
@@ -4683,7 +4683,7 @@
         </p:spPr>
         <p:txBody>
           <a:bodyPr bIns="45700" rIns="91425" lIns="91425" tIns="45700" anchor="ctr" anchorCtr="0">
-            <a:normAutofit/>
+            <a:noAutofit/>
           </a:bodyPr>
           <a:lstStyle/>
           <a:p>
@@ -4752,7 +4752,7 @@
         </p:spPr>
         <p:txBody>
           <a:bodyPr bIns="45700" rIns="91425" lIns="91425" tIns="45700" anchor="ctr" anchorCtr="0">
-            <a:normAutofit/>
+            <a:noAutofit/>
           </a:bodyPr>
           <a:lstStyle/>
           <a:p>
@@ -4947,7 +4947,7 @@
           </p:spPr>
           <p:txBody>
             <a:bodyPr bIns="45700" rIns="91425" lIns="91425" tIns="45700" anchor="ctr" anchorCtr="0">
-              <a:normAutofit/>
+              <a:noAutofit/>
             </a:bodyPr>
             <a:lstStyle/>
             <a:p>
@@ -5030,7 +5030,7 @@
           </p:spPr>
           <p:txBody>
             <a:bodyPr bIns="45700" rIns="91425" lIns="91425" tIns="45700" anchor="ctr" anchorCtr="0">
-              <a:normAutofit/>
+              <a:noAutofit/>
             </a:bodyPr>
             <a:lstStyle/>
             <a:p>
@@ -5108,7 +5108,7 @@
           </p:spPr>
           <p:txBody>
             <a:bodyPr bIns="45700" rIns="91425" lIns="91425" tIns="45700" anchor="ctr" anchorCtr="0">
-              <a:normAutofit/>
+              <a:noAutofit/>
             </a:bodyPr>
             <a:lstStyle/>
             <a:p>
@@ -7142,7 +7142,7 @@
         </p:spPr>
         <p:txBody>
           <a:bodyPr bIns="45700" rIns="91425" lIns="91425" tIns="45700" anchor="ctr" anchorCtr="0">
-            <a:normAutofit/>
+            <a:noAutofit/>
           </a:bodyPr>
           <a:lstStyle/>
           <a:p>
@@ -7191,7 +7191,7 @@
         </p:spPr>
         <p:txBody>
           <a:bodyPr bIns="45700" rIns="91425" lIns="91425" tIns="45700" anchor="t" anchorCtr="0">
-            <a:normAutofit/>
+            <a:noAutofit/>
           </a:bodyPr>
           <a:lstStyle/>
           <a:p>
@@ -7234,7 +7234,7 @@
         </p:spPr>
         <p:txBody>
           <a:bodyPr bIns="91425" rIns="91425" lIns="91425" tIns="91425" anchor="t" anchorCtr="0">
-            <a:normAutofit/>
+            <a:noAutofit/>
           </a:bodyPr>
           <a:lstStyle/>
           <a:p>
@@ -7410,7 +7410,7 @@
         </p:spPr>
         <p:txBody>
           <a:bodyPr bIns="45700" rIns="91425" lIns="91425" tIns="45700" anchor="ctr" anchorCtr="0">
-            <a:normAutofit/>
+            <a:noAutofit/>
           </a:bodyPr>
           <a:lstStyle/>
           <a:p>
@@ -7463,7 +7463,7 @@
         </p:spPr>
         <p:txBody>
           <a:bodyPr bIns="45700" rIns="91425" lIns="91425" tIns="45700" anchor="t" anchorCtr="0">
-            <a:normAutofit/>
+            <a:noAutofit/>
           </a:bodyPr>
           <a:lstStyle/>
           <a:p>
@@ -7578,85 +7578,24 @@
           <p:cNvPr id="119" name="Shape 119"/>
           <p:cNvSpPr txBox="1"/>
           <p:nvPr>
-            <p:ph type="title"/>
+            <p:ph idx="1" type="body"/>
           </p:nvPr>
         </p:nvSpPr>
         <p:spPr>
           <a:xfrm>
-            <a:off y="274637" x="457200"/>
-            <a:ext cy="1143000" cx="8229600"/>
+            <a:off y="1600200" x="457200"/>
+            <a:ext cy="4526100" cx="8229600"/>
           </a:xfrm>
           <a:prstGeom prst="rect">
             <a:avLst/>
           </a:prstGeom>
         </p:spPr>
         <p:txBody>
-          <a:bodyPr bIns="91425" rIns="91425" lIns="91425" tIns="91425" anchor="ctr" anchorCtr="0">
-            <a:normAutofit/>
+          <a:bodyPr bIns="91425" rIns="91425" lIns="91425" tIns="91425" anchor="t" anchorCtr="0">
+            <a:noAutofit/>
           </a:bodyPr>
           <a:lstStyle/>
           <a:p>
-            <a:pPr rtl="0" lvl="0">
-              <a:spcBef>
-                <a:spcPts val="0"/>
-              </a:spcBef>
-              <a:buClr>
-                <a:schemeClr val="dk1"/>
-              </a:buClr>
-              <a:buSzPct val="25000"/>
-              <a:buFont typeface="Calibri"/>
-              <a:buNone/>
-            </a:pPr>
-            <a:r>
-              <a:rPr sz="4400" lang="pt-BR">
-                <a:solidFill>
-                  <a:schemeClr val="dk1"/>
-                </a:solidFill>
-                <a:latin typeface="Calibri"/>
-                <a:ea typeface="Calibri"/>
-                <a:cs typeface="Calibri"/>
-                <a:sym typeface="Calibri"/>
-              </a:rPr>
-              <a:t>Ferramentas de desenvolvimento</a:t>
-            </a:r>
-          </a:p>
-          <a:p>
-            <a:pPr>
-              <a:spcBef>
-                <a:spcPts val="0"/>
-              </a:spcBef>
-              <a:buNone/>
-            </a:pPr>
-            <a:r>
-              <a:t/>
-            </a:r>
-            <a:endParaRPr/>
-          </a:p>
-        </p:txBody>
-      </p:sp>
-      <p:sp>
-        <p:nvSpPr>
-          <p:cNvPr id="120" name="Shape 120"/>
-          <p:cNvSpPr txBox="1"/>
-          <p:nvPr>
-            <p:ph idx="1" type="body"/>
-          </p:nvPr>
-        </p:nvSpPr>
-        <p:spPr>
-          <a:xfrm>
-            <a:off y="1600200" x="457200"/>
-            <a:ext cy="4526100" cx="8229600"/>
-          </a:xfrm>
-          <a:prstGeom prst="rect">
-            <a:avLst/>
-          </a:prstGeom>
-        </p:spPr>
-        <p:txBody>
-          <a:bodyPr bIns="91425" rIns="91425" lIns="91425" tIns="91425" anchor="t" anchorCtr="0">
-            <a:normAutofit/>
-          </a:bodyPr>
-          <a:lstStyle/>
-          <a:p>
             <a:pPr>
               <a:spcBef>
                 <a:spcPts val="0"/>
@@ -7672,7 +7611,7 @@
       </p:sp>
       <p:pic>
         <p:nvPicPr>
-          <p:cNvPr id="121" name="Shape 121"/>
+          <p:cNvPr id="120" name="Shape 120"/>
           <p:cNvPicPr preferRelativeResize="0"/>
           <p:nvPr/>
         </p:nvPicPr>
@@ -7698,6 +7637,59 @@
           </a:ln>
         </p:spPr>
       </p:pic>
+      <p:sp>
+        <p:nvSpPr>
+          <p:cNvPr id="121" name="Shape 121"/>
+          <p:cNvSpPr txBox="1"/>
+          <p:nvPr>
+            <p:ph type="title"/>
+          </p:nvPr>
+        </p:nvSpPr>
+        <p:spPr>
+          <a:xfrm>
+            <a:off y="274637" x="457200"/>
+            <a:ext cy="1143000" cx="8229600"/>
+          </a:xfrm>
+          <a:prstGeom prst="rect">
+            <a:avLst/>
+          </a:prstGeom>
+          <a:noFill/>
+          <a:ln>
+            <a:noFill/>
+          </a:ln>
+        </p:spPr>
+        <p:txBody>
+          <a:bodyPr bIns="45700" rIns="91425" lIns="91425" tIns="45700" anchor="ctr" anchorCtr="0">
+            <a:noAutofit/>
+          </a:bodyPr>
+          <a:lstStyle/>
+          <a:p>
+            <a:pPr algn="ctr" rtl="0" lvl="0" marR="0" indent="0" marL="0">
+              <a:spcBef>
+                <a:spcPts val="0"/>
+              </a:spcBef>
+              <a:buClr>
+                <a:schemeClr val="dk1"/>
+              </a:buClr>
+              <a:buSzPct val="25000"/>
+              <a:buFont typeface="Calibri"/>
+              <a:buNone/>
+            </a:pPr>
+            <a:r>
+              <a:rPr strike="noStrike" u="none" b="0" cap="none" baseline="0" sz="4400" lang="pt-BR" i="0">
+                <a:solidFill>
+                  <a:schemeClr val="dk1"/>
+                </a:solidFill>
+                <a:latin typeface="Calibri"/>
+                <a:ea typeface="Calibri"/>
+                <a:cs typeface="Calibri"/>
+                <a:sym typeface="Calibri"/>
+              </a:rPr>
+              <a:t>Ferramentas de desenvolvimento</a:t>
+            </a:r>
+          </a:p>
+        </p:txBody>
+      </p:sp>
     </p:spTree>
   </p:cSld>
   <p:clrMapOvr>
@@ -7742,14 +7734,18 @@
           <a:prstGeom prst="rect">
             <a:avLst/>
           </a:prstGeom>
+          <a:noFill/>
+          <a:ln>
+            <a:noFill/>
+          </a:ln>
         </p:spPr>
         <p:txBody>
-          <a:bodyPr bIns="91425" rIns="91425" lIns="91425" tIns="91425" anchor="ctr" anchorCtr="0">
-            <a:normAutofit/>
+          <a:bodyPr bIns="45700" rIns="91425" lIns="91425" tIns="45700" anchor="ctr" anchorCtr="0">
+            <a:noAutofit/>
           </a:bodyPr>
           <a:lstStyle/>
           <a:p>
-            <a:pPr rtl="0" lvl="0">
+            <a:pPr algn="ctr" rtl="0" lvl="0" marR="0" indent="0" marL="0">
               <a:spcBef>
                 <a:spcPts val="0"/>
               </a:spcBef>
@@ -7761,7 +7757,7 @@
               <a:buNone/>
             </a:pPr>
             <a:r>
-              <a:rPr sz="4400" lang="pt-BR">
+              <a:rPr strike="noStrike" u="none" b="0" cap="none" baseline="0" sz="4400" lang="pt-BR" i="0">
                 <a:solidFill>
                   <a:schemeClr val="dk1"/>
                 </a:solidFill>
@@ -7773,74 +7769,25 @@
               <a:t>Ferramentas de desenvolvimento</a:t>
             </a:r>
           </a:p>
-          <a:p>
-            <a:pPr>
-              <a:spcBef>
-                <a:spcPts val="0"/>
-              </a:spcBef>
-              <a:buNone/>
-            </a:pPr>
-            <a:r>
-              <a:t/>
-            </a:r>
-            <a:endParaRPr/>
-          </a:p>
-        </p:txBody>
-      </p:sp>
-      <p:sp>
-        <p:nvSpPr>
-          <p:cNvPr id="127" name="Shape 127"/>
-          <p:cNvSpPr txBox="1"/>
-          <p:nvPr>
-            <p:ph idx="1" type="body"/>
-          </p:nvPr>
-        </p:nvSpPr>
-        <p:spPr>
-          <a:xfrm>
-            <a:off y="1600200" x="457200"/>
-            <a:ext cy="4526100" cx="8229600"/>
-          </a:xfrm>
-          <a:prstGeom prst="rect">
-            <a:avLst/>
-          </a:prstGeom>
-        </p:spPr>
-        <p:txBody>
-          <a:bodyPr bIns="91425" rIns="91425" lIns="91425" tIns="91425" anchor="t" anchorCtr="0">
-            <a:normAutofit/>
-          </a:bodyPr>
-          <a:lstStyle/>
-          <a:p>
-            <a:pPr>
-              <a:spcBef>
-                <a:spcPts val="0"/>
-              </a:spcBef>
-              <a:buNone/>
-            </a:pPr>
-            <a:r>
-              <a:t/>
-            </a:r>
-            <a:endParaRPr/>
-          </a:p>
         </p:txBody>
       </p:sp>
       <p:pic>
         <p:nvPicPr>
-          <p:cNvPr id="128" name="Shape 128"/>
+          <p:cNvPr id="127" name="Shape 127"/>
           <p:cNvPicPr preferRelativeResize="0"/>
           <p:nvPr/>
         </p:nvPicPr>
-        <p:blipFill>
+        <p:blipFill rotWithShape="1">
           <a:blip r:embed="rId3">
             <a:alphaModFix/>
           </a:blip>
-          <a:stretch>
-            <a:fillRect/>
-          </a:stretch>
+          <a:srcRect t="2945" b="16564" r="-849" l="850"/>
+          <a:stretch/>
         </p:blipFill>
         <p:spPr>
           <a:xfrm>
-            <a:off y="1220100" x="0"/>
-            <a:ext cy="5057950" cx="9144000"/>
+            <a:off y="1756450" x="0"/>
+            <a:ext cy="3837350" cx="9144000"/>
           </a:xfrm>
           <a:prstGeom prst="rect">
             <a:avLst/>
@@ -7867,7 +7814,7 @@
   <p:cSld>
     <p:spTree>
       <p:nvGrpSpPr>
-        <p:cNvPr id="132" name="Shape 132"/>
+        <p:cNvPr id="131" name="Shape 131"/>
         <p:cNvGrpSpPr/>
         <p:nvPr/>
       </p:nvGrpSpPr>
@@ -7881,68 +7828,7 @@
       </p:grpSpPr>
       <p:sp>
         <p:nvSpPr>
-          <p:cNvPr id="133" name="Shape 133"/>
-          <p:cNvSpPr txBox="1"/>
-          <p:nvPr>
-            <p:ph type="title"/>
-          </p:nvPr>
-        </p:nvSpPr>
-        <p:spPr>
-          <a:xfrm>
-            <a:off y="274637" x="457200"/>
-            <a:ext cy="1143000" cx="8229600"/>
-          </a:xfrm>
-          <a:prstGeom prst="rect">
-            <a:avLst/>
-          </a:prstGeom>
-        </p:spPr>
-        <p:txBody>
-          <a:bodyPr bIns="91425" rIns="91425" lIns="91425" tIns="91425" anchor="ctr" anchorCtr="0">
-            <a:normAutofit/>
-          </a:bodyPr>
-          <a:lstStyle/>
-          <a:p>
-            <a:pPr rtl="0" lvl="0">
-              <a:spcBef>
-                <a:spcPts val="0"/>
-              </a:spcBef>
-              <a:buClr>
-                <a:schemeClr val="dk1"/>
-              </a:buClr>
-              <a:buSzPct val="25000"/>
-              <a:buFont typeface="Calibri"/>
-              <a:buNone/>
-            </a:pPr>
-            <a:r>
-              <a:rPr sz="4400" lang="pt-BR">
-                <a:solidFill>
-                  <a:schemeClr val="dk1"/>
-                </a:solidFill>
-                <a:latin typeface="Calibri"/>
-                <a:ea typeface="Calibri"/>
-                <a:cs typeface="Calibri"/>
-                <a:sym typeface="Calibri"/>
-              </a:rPr>
-              <a:t>Ferramentas de desenvolvimento</a:t>
-            </a:r>
-          </a:p>
-          <a:p>
-            <a:pPr>
-              <a:spcBef>
-                <a:spcPts val="0"/>
-              </a:spcBef>
-              <a:buNone/>
-            </a:pPr>
-            <a:r>
-              <a:t/>
-            </a:r>
-            <a:endParaRPr/>
-          </a:p>
-        </p:txBody>
-      </p:sp>
-      <p:sp>
-        <p:nvSpPr>
-          <p:cNvPr id="134" name="Shape 134"/>
+          <p:cNvPr id="132" name="Shape 132"/>
           <p:cNvSpPr txBox="1"/>
           <p:nvPr>
             <p:ph idx="1" type="body"/>
@@ -7959,7 +7845,7 @@
         </p:spPr>
         <p:txBody>
           <a:bodyPr bIns="91425" rIns="91425" lIns="91425" tIns="91425" anchor="t" anchorCtr="0">
-            <a:normAutofit/>
+            <a:noAutofit/>
           </a:bodyPr>
           <a:lstStyle/>
           <a:p>
@@ -8003,7 +7889,7 @@
       </p:sp>
       <p:pic>
         <p:nvPicPr>
-          <p:cNvPr id="135" name="Shape 135"/>
+          <p:cNvPr id="133" name="Shape 133"/>
           <p:cNvPicPr preferRelativeResize="0"/>
           <p:nvPr/>
         </p:nvPicPr>
@@ -8029,6 +7915,59 @@
           </a:ln>
         </p:spPr>
       </p:pic>
+      <p:sp>
+        <p:nvSpPr>
+          <p:cNvPr id="134" name="Shape 134"/>
+          <p:cNvSpPr txBox="1"/>
+          <p:nvPr>
+            <p:ph type="title"/>
+          </p:nvPr>
+        </p:nvSpPr>
+        <p:spPr>
+          <a:xfrm>
+            <a:off y="274637" x="457200"/>
+            <a:ext cy="1143000" cx="8229600"/>
+          </a:xfrm>
+          <a:prstGeom prst="rect">
+            <a:avLst/>
+          </a:prstGeom>
+          <a:noFill/>
+          <a:ln>
+            <a:noFill/>
+          </a:ln>
+        </p:spPr>
+        <p:txBody>
+          <a:bodyPr bIns="45700" rIns="91425" lIns="91425" tIns="45700" anchor="ctr" anchorCtr="0">
+            <a:noAutofit/>
+          </a:bodyPr>
+          <a:lstStyle/>
+          <a:p>
+            <a:pPr algn="ctr" rtl="0" lvl="0" marR="0" indent="0" marL="0">
+              <a:spcBef>
+                <a:spcPts val="0"/>
+              </a:spcBef>
+              <a:buClr>
+                <a:schemeClr val="dk1"/>
+              </a:buClr>
+              <a:buSzPct val="25000"/>
+              <a:buFont typeface="Calibri"/>
+              <a:buNone/>
+            </a:pPr>
+            <a:r>
+              <a:rPr strike="noStrike" u="none" b="0" cap="none" baseline="0" sz="4400" lang="pt-BR" i="0">
+                <a:solidFill>
+                  <a:schemeClr val="dk1"/>
+                </a:solidFill>
+                <a:latin typeface="Calibri"/>
+                <a:ea typeface="Calibri"/>
+                <a:cs typeface="Calibri"/>
+                <a:sym typeface="Calibri"/>
+              </a:rPr>
+              <a:t>Ferramentas de desenvolvimento</a:t>
+            </a:r>
+          </a:p>
+        </p:txBody>
+      </p:sp>
     </p:spTree>
   </p:cSld>
   <p:clrMapOvr>
@@ -8045,7 +7984,7 @@
   <p:cSld>
     <p:spTree>
       <p:nvGrpSpPr>
-        <p:cNvPr id="139" name="Shape 139"/>
+        <p:cNvPr id="138" name="Shape 138"/>
         <p:cNvGrpSpPr/>
         <p:nvPr/>
       </p:nvGrpSpPr>
@@ -8059,68 +7998,7 @@
       </p:grpSpPr>
       <p:sp>
         <p:nvSpPr>
-          <p:cNvPr id="140" name="Shape 140"/>
-          <p:cNvSpPr txBox="1"/>
-          <p:nvPr>
-            <p:ph type="title"/>
-          </p:nvPr>
-        </p:nvSpPr>
-        <p:spPr>
-          <a:xfrm>
-            <a:off y="274637" x="457200"/>
-            <a:ext cy="1143000" cx="8229600"/>
-          </a:xfrm>
-          <a:prstGeom prst="rect">
-            <a:avLst/>
-          </a:prstGeom>
-        </p:spPr>
-        <p:txBody>
-          <a:bodyPr bIns="91425" rIns="91425" lIns="91425" tIns="91425" anchor="ctr" anchorCtr="0">
-            <a:normAutofit/>
-          </a:bodyPr>
-          <a:lstStyle/>
-          <a:p>
-            <a:pPr rtl="0" lvl="0">
-              <a:spcBef>
-                <a:spcPts val="0"/>
-              </a:spcBef>
-              <a:buClr>
-                <a:schemeClr val="dk1"/>
-              </a:buClr>
-              <a:buSzPct val="25000"/>
-              <a:buFont typeface="Calibri"/>
-              <a:buNone/>
-            </a:pPr>
-            <a:r>
-              <a:rPr sz="4400" lang="pt-BR">
-                <a:solidFill>
-                  <a:schemeClr val="dk1"/>
-                </a:solidFill>
-                <a:latin typeface="Calibri"/>
-                <a:ea typeface="Calibri"/>
-                <a:cs typeface="Calibri"/>
-                <a:sym typeface="Calibri"/>
-              </a:rPr>
-              <a:t>Ferramentas de desenvolvimento</a:t>
-            </a:r>
-          </a:p>
-          <a:p>
-            <a:pPr>
-              <a:spcBef>
-                <a:spcPts val="0"/>
-              </a:spcBef>
-              <a:buNone/>
-            </a:pPr>
-            <a:r>
-              <a:t/>
-            </a:r>
-            <a:endParaRPr/>
-          </a:p>
-        </p:txBody>
-      </p:sp>
-      <p:sp>
-        <p:nvSpPr>
-          <p:cNvPr id="141" name="Shape 141"/>
+          <p:cNvPr id="139" name="Shape 139"/>
           <p:cNvSpPr txBox="1"/>
           <p:nvPr>
             <p:ph idx="1" type="body"/>
@@ -8137,7 +8015,7 @@
         </p:spPr>
         <p:txBody>
           <a:bodyPr bIns="91425" rIns="91425" lIns="91425" tIns="91425" anchor="t" anchorCtr="0">
-            <a:normAutofit/>
+            <a:noAutofit/>
           </a:bodyPr>
           <a:lstStyle/>
           <a:p>
@@ -8184,7 +8062,7 @@
       </p:sp>
       <p:pic>
         <p:nvPicPr>
-          <p:cNvPr id="142" name="Shape 142"/>
+          <p:cNvPr id="140" name="Shape 140"/>
           <p:cNvPicPr preferRelativeResize="0"/>
           <p:nvPr/>
         </p:nvPicPr>
@@ -8210,6 +8088,59 @@
           </a:ln>
         </p:spPr>
       </p:pic>
+      <p:sp>
+        <p:nvSpPr>
+          <p:cNvPr id="141" name="Shape 141"/>
+          <p:cNvSpPr txBox="1"/>
+          <p:nvPr>
+            <p:ph type="title"/>
+          </p:nvPr>
+        </p:nvSpPr>
+        <p:spPr>
+          <a:xfrm>
+            <a:off y="274637" x="457200"/>
+            <a:ext cy="1143000" cx="8229600"/>
+          </a:xfrm>
+          <a:prstGeom prst="rect">
+            <a:avLst/>
+          </a:prstGeom>
+          <a:noFill/>
+          <a:ln>
+            <a:noFill/>
+          </a:ln>
+        </p:spPr>
+        <p:txBody>
+          <a:bodyPr bIns="45700" rIns="91425" lIns="91425" tIns="45700" anchor="ctr" anchorCtr="0">
+            <a:noAutofit/>
+          </a:bodyPr>
+          <a:lstStyle/>
+          <a:p>
+            <a:pPr algn="ctr" rtl="0" lvl="0" marR="0" indent="0" marL="0">
+              <a:spcBef>
+                <a:spcPts val="0"/>
+              </a:spcBef>
+              <a:buClr>
+                <a:schemeClr val="dk1"/>
+              </a:buClr>
+              <a:buSzPct val="25000"/>
+              <a:buFont typeface="Calibri"/>
+              <a:buNone/>
+            </a:pPr>
+            <a:r>
+              <a:rPr strike="noStrike" u="none" b="0" cap="none" baseline="0" sz="4400" lang="pt-BR" i="0">
+                <a:solidFill>
+                  <a:schemeClr val="dk1"/>
+                </a:solidFill>
+                <a:latin typeface="Calibri"/>
+                <a:ea typeface="Calibri"/>
+                <a:cs typeface="Calibri"/>
+                <a:sym typeface="Calibri"/>
+              </a:rPr>
+              <a:t>Ferramentas de desenvolvimento</a:t>
+            </a:r>
+          </a:p>
+        </p:txBody>
+      </p:sp>
     </p:spTree>
   </p:cSld>
   <p:clrMapOvr>
@@ -8226,7 +8157,7 @@
   <p:cSld>
     <p:spTree>
       <p:nvGrpSpPr>
-        <p:cNvPr id="146" name="Shape 146"/>
+        <p:cNvPr id="145" name="Shape 145"/>
         <p:cNvGrpSpPr/>
         <p:nvPr/>
       </p:nvGrpSpPr>
@@ -8240,88 +8171,7 @@
       </p:grpSpPr>
       <p:sp>
         <p:nvSpPr>
-          <p:cNvPr id="147" name="Shape 147"/>
-          <p:cNvSpPr txBox="1"/>
-          <p:nvPr>
-            <p:ph type="title"/>
-          </p:nvPr>
-        </p:nvSpPr>
-        <p:spPr>
-          <a:xfrm>
-            <a:off y="274637" x="457200"/>
-            <a:ext cy="1143000" cx="8229600"/>
-          </a:xfrm>
-          <a:prstGeom prst="rect">
-            <a:avLst/>
-          </a:prstGeom>
-        </p:spPr>
-        <p:txBody>
-          <a:bodyPr bIns="91425" rIns="91425" lIns="91425" tIns="91425" anchor="ctr" anchorCtr="0">
-            <a:normAutofit/>
-          </a:bodyPr>
-          <a:lstStyle/>
-          <a:p>
-            <a:pPr rtl="0" lvl="0">
-              <a:spcBef>
-                <a:spcPts val="0"/>
-              </a:spcBef>
-              <a:buClr>
-                <a:schemeClr val="dk1"/>
-              </a:buClr>
-              <a:buSzPct val="25000"/>
-              <a:buFont typeface="Calibri"/>
-              <a:buNone/>
-            </a:pPr>
-            <a:r>
-              <a:rPr sz="4400" lang="pt-BR">
-                <a:solidFill>
-                  <a:schemeClr val="dk1"/>
-                </a:solidFill>
-                <a:latin typeface="Calibri"/>
-                <a:ea typeface="Calibri"/>
-                <a:cs typeface="Calibri"/>
-                <a:sym typeface="Calibri"/>
-              </a:rPr>
-              <a:t>Ferramentas de desenvolvimento</a:t>
-            </a:r>
-          </a:p>
-          <a:p>
-            <a:pPr rtl="0" lvl="0">
-              <a:spcBef>
-                <a:spcPts val="0"/>
-              </a:spcBef>
-              <a:buClr>
-                <a:schemeClr val="dk1"/>
-              </a:buClr>
-              <a:buFont typeface="Arial"/>
-              <a:buNone/>
-            </a:pPr>
-            <a:r>
-              <a:t/>
-            </a:r>
-            <a:endParaRPr>
-              <a:solidFill>
-                <a:schemeClr val="dk1"/>
-              </a:solidFill>
-            </a:endParaRPr>
-          </a:p>
-          <a:p>
-            <a:pPr>
-              <a:spcBef>
-                <a:spcPts val="0"/>
-              </a:spcBef>
-              <a:buNone/>
-            </a:pPr>
-            <a:r>
-              <a:t/>
-            </a:r>
-            <a:endParaRPr/>
-          </a:p>
-        </p:txBody>
-      </p:sp>
-      <p:sp>
-        <p:nvSpPr>
-          <p:cNvPr id="148" name="Shape 148"/>
+          <p:cNvPr id="146" name="Shape 146"/>
           <p:cNvSpPr txBox="1"/>
           <p:nvPr>
             <p:ph idx="1" type="body"/>
@@ -8338,7 +8188,7 @@
         </p:spPr>
         <p:txBody>
           <a:bodyPr bIns="91425" rIns="91425" lIns="91425" tIns="91425" anchor="t" anchorCtr="0">
-            <a:normAutofit/>
+            <a:noAutofit/>
           </a:bodyPr>
           <a:lstStyle/>
           <a:p>
@@ -8402,6 +8252,59 @@
               <a:t/>
             </a:r>
             <a:endParaRPr/>
+          </a:p>
+        </p:txBody>
+      </p:sp>
+      <p:sp>
+        <p:nvSpPr>
+          <p:cNvPr id="147" name="Shape 147"/>
+          <p:cNvSpPr txBox="1"/>
+          <p:nvPr>
+            <p:ph type="title"/>
+          </p:nvPr>
+        </p:nvSpPr>
+        <p:spPr>
+          <a:xfrm>
+            <a:off y="274637" x="457200"/>
+            <a:ext cy="1143000" cx="8229600"/>
+          </a:xfrm>
+          <a:prstGeom prst="rect">
+            <a:avLst/>
+          </a:prstGeom>
+          <a:noFill/>
+          <a:ln>
+            <a:noFill/>
+          </a:ln>
+        </p:spPr>
+        <p:txBody>
+          <a:bodyPr bIns="45700" rIns="91425" lIns="91425" tIns="45700" anchor="ctr" anchorCtr="0">
+            <a:noAutofit/>
+          </a:bodyPr>
+          <a:lstStyle/>
+          <a:p>
+            <a:pPr algn="ctr" rtl="0" lvl="0" marR="0" indent="0" marL="0">
+              <a:spcBef>
+                <a:spcPts val="0"/>
+              </a:spcBef>
+              <a:buClr>
+                <a:schemeClr val="dk1"/>
+              </a:buClr>
+              <a:buSzPct val="25000"/>
+              <a:buFont typeface="Calibri"/>
+              <a:buNone/>
+            </a:pPr>
+            <a:r>
+              <a:rPr strike="noStrike" u="none" b="0" cap="none" baseline="0" sz="4400" lang="pt-BR" i="0">
+                <a:solidFill>
+                  <a:schemeClr val="dk1"/>
+                </a:solidFill>
+                <a:latin typeface="Calibri"/>
+                <a:ea typeface="Calibri"/>
+                <a:cs typeface="Calibri"/>
+                <a:sym typeface="Calibri"/>
+              </a:rPr>
+              <a:t>Ferramentas de desenvolvimento</a:t>
+            </a:r>
           </a:p>
         </p:txBody>
       </p:sp>
@@ -8421,7 +8324,7 @@
   <p:cSld>
     <p:spTree>
       <p:nvGrpSpPr>
-        <p:cNvPr id="152" name="Shape 152"/>
+        <p:cNvPr id="151" name="Shape 151"/>
         <p:cNvGrpSpPr/>
         <p:nvPr/>
       </p:nvGrpSpPr>
@@ -8435,7 +8338,7 @@
       </p:grpSpPr>
       <p:sp>
         <p:nvSpPr>
-          <p:cNvPr id="153" name="Shape 153"/>
+          <p:cNvPr id="152" name="Shape 152"/>
           <p:cNvSpPr txBox="1"/>
           <p:nvPr>
             <p:ph type="title"/>
@@ -8456,7 +8359,7 @@
         </p:spPr>
         <p:txBody>
           <a:bodyPr bIns="45700" rIns="91425" lIns="91425" tIns="45700" anchor="ctr" anchorCtr="0">
-            <a:normAutofit/>
+            <a:noAutofit/>
           </a:bodyPr>
           <a:lstStyle/>
           <a:p>
@@ -8488,7 +8391,7 @@
       </p:sp>
       <p:sp>
         <p:nvSpPr>
-          <p:cNvPr id="154" name="Shape 154"/>
+          <p:cNvPr id="153" name="Shape 153"/>
           <p:cNvSpPr txBox="1"/>
           <p:nvPr>
             <p:ph idx="1" type="body"/>
@@ -8509,7 +8412,7 @@
         </p:spPr>
         <p:txBody>
           <a:bodyPr bIns="45700" rIns="91425" lIns="91425" tIns="45700" anchor="t" anchorCtr="0">
-            <a:normAutofit/>
+            <a:noAutofit/>
           </a:bodyPr>
           <a:lstStyle/>
           <a:p>
@@ -8605,7 +8508,7 @@
       </p:sp>
       <p:pic>
         <p:nvPicPr>
-          <p:cNvPr id="155" name="Shape 155"/>
+          <p:cNvPr id="154" name="Shape 154"/>
           <p:cNvPicPr preferRelativeResize="0"/>
           <p:nvPr/>
         </p:nvPicPr>
@@ -8647,7 +8550,7 @@
   <p:cSld>
     <p:spTree>
       <p:nvGrpSpPr>
-        <p:cNvPr id="159" name="Shape 159"/>
+        <p:cNvPr id="158" name="Shape 158"/>
         <p:cNvGrpSpPr/>
         <p:nvPr/>
       </p:nvGrpSpPr>
@@ -8661,7 +8564,7 @@
       </p:grpSpPr>
       <p:sp>
         <p:nvSpPr>
-          <p:cNvPr id="160" name="Shape 160"/>
+          <p:cNvPr id="159" name="Shape 159"/>
           <p:cNvSpPr txBox="1"/>
           <p:nvPr>
             <p:ph type="title"/>
@@ -8678,18 +8581,18 @@
         </p:spPr>
         <p:txBody>
           <a:bodyPr bIns="91425" rIns="91425" lIns="91425" tIns="91425" anchor="ctr" anchorCtr="0">
-            <a:normAutofit/>
+            <a:noAutofit/>
           </a:bodyPr>
           <a:lstStyle/>
           <a:p>
-            <a:pPr>
+            <a:pPr rtl="0" lvl="0">
               <a:spcBef>
                 <a:spcPts val="0"/>
               </a:spcBef>
               <a:buNone/>
             </a:pPr>
             <a:r>
-              <a:rPr sz="4400" lang="pt-BR">
+              <a:rPr b="0" sz="4400" lang="pt-BR">
                 <a:solidFill>
                   <a:schemeClr val="dk1"/>
                 </a:solidFill>
@@ -8705,22 +8608,21 @@
       </p:sp>
       <p:pic>
         <p:nvPicPr>
-          <p:cNvPr id="161" name="Shape 161"/>
+          <p:cNvPr id="160" name="Shape 160"/>
           <p:cNvPicPr preferRelativeResize="0"/>
           <p:nvPr/>
         </p:nvPicPr>
-        <p:blipFill>
+        <p:blipFill rotWithShape="1">
           <a:blip r:embed="rId3">
             <a:alphaModFix/>
           </a:blip>
-          <a:stretch>
-            <a:fillRect/>
-          </a:stretch>
+          <a:srcRect t="0" b="3418" r="0" l="0"/>
+          <a:stretch/>
         </p:blipFill>
         <p:spPr>
           <a:xfrm>
             <a:off y="1147575" x="457200"/>
-            <a:ext cy="5391449" cx="8229599"/>
+            <a:ext cy="5206975" cx="8229599"/>
           </a:xfrm>
           <a:prstGeom prst="rect">
             <a:avLst/>
@@ -8747,7 +8649,7 @@
   <p:cSld>
     <p:spTree>
       <p:nvGrpSpPr>
-        <p:cNvPr id="165" name="Shape 165"/>
+        <p:cNvPr id="164" name="Shape 164"/>
         <p:cNvGrpSpPr/>
         <p:nvPr/>
       </p:nvGrpSpPr>
@@ -8761,7 +8663,7 @@
       </p:grpSpPr>
       <p:sp>
         <p:nvSpPr>
-          <p:cNvPr id="166" name="Shape 166"/>
+          <p:cNvPr id="165" name="Shape 165"/>
           <p:cNvSpPr txBox="1"/>
           <p:nvPr>
             <p:ph type="title"/>
@@ -8782,7 +8684,7 @@
         </p:spPr>
         <p:txBody>
           <a:bodyPr bIns="45700" rIns="91425" lIns="91425" tIns="45700" anchor="ctr" anchorCtr="0">
-            <a:normAutofit/>
+            <a:noAutofit/>
           </a:bodyPr>
           <a:lstStyle/>
           <a:p>
@@ -8814,7 +8716,7 @@
       </p:sp>
       <p:sp>
         <p:nvSpPr>
-          <p:cNvPr id="167" name="Shape 167"/>
+          <p:cNvPr id="166" name="Shape 166"/>
           <p:cNvSpPr txBox="1"/>
           <p:nvPr>
             <p:ph idx="1" type="body"/>
@@ -8835,7 +8737,7 @@
         </p:spPr>
         <p:txBody>
           <a:bodyPr bIns="45700" rIns="91425" lIns="91425" tIns="45700" anchor="t" anchorCtr="0">
-            <a:normAutofit/>
+            <a:noAutofit/>
           </a:bodyPr>
           <a:lstStyle/>
           <a:p>
@@ -8956,7 +8858,7 @@
   <p:cSld>
     <p:spTree>
       <p:nvGrpSpPr>
-        <p:cNvPr id="171" name="Shape 171"/>
+        <p:cNvPr id="170" name="Shape 170"/>
         <p:cNvGrpSpPr/>
         <p:nvPr/>
       </p:nvGrpSpPr>
@@ -8970,7 +8872,7 @@
       </p:grpSpPr>
       <p:sp>
         <p:nvSpPr>
-          <p:cNvPr id="172" name="Shape 172"/>
+          <p:cNvPr id="171" name="Shape 171"/>
           <p:cNvSpPr txBox="1"/>
           <p:nvPr>
             <p:ph type="title"/>
@@ -8991,7 +8893,7 @@
         </p:spPr>
         <p:txBody>
           <a:bodyPr bIns="45700" rIns="91425" lIns="91425" tIns="45700" anchor="ctr" anchorCtr="0">
-            <a:normAutofit/>
+            <a:noAutofit/>
           </a:bodyPr>
           <a:lstStyle/>
           <a:p>
@@ -9023,7 +8925,7 @@
       </p:sp>
       <p:pic>
         <p:nvPicPr>
-          <p:cNvPr id="173" name="Shape 173"/>
+          <p:cNvPr id="172" name="Shape 172"/>
           <p:cNvPicPr preferRelativeResize="0"/>
           <p:nvPr/>
         </p:nvPicPr>
@@ -9100,7 +9002,7 @@
         </p:spPr>
         <p:txBody>
           <a:bodyPr bIns="45700" rIns="91425" lIns="91425" tIns="45700" anchor="ctr" anchorCtr="0">
-            <a:normAutofit/>
+            <a:noAutofit/>
           </a:bodyPr>
           <a:lstStyle/>
           <a:p>
@@ -9153,7 +9055,7 @@
         </p:spPr>
         <p:txBody>
           <a:bodyPr bIns="45700" rIns="91425" lIns="91425" tIns="45700" anchor="t" anchorCtr="0">
-            <a:normAutofit/>
+            <a:noAutofit/>
           </a:bodyPr>
           <a:lstStyle/>
           <a:p>
@@ -9299,7 +9201,7 @@
   <p:cSld>
     <p:spTree>
       <p:nvGrpSpPr>
-        <p:cNvPr id="177" name="Shape 177"/>
+        <p:cNvPr id="176" name="Shape 176"/>
         <p:cNvGrpSpPr/>
         <p:nvPr/>
       </p:nvGrpSpPr>
@@ -9313,7 +9215,7 @@
       </p:grpSpPr>
       <p:sp>
         <p:nvSpPr>
-          <p:cNvPr id="178" name="Shape 178"/>
+          <p:cNvPr id="177" name="Shape 177"/>
           <p:cNvSpPr txBox="1"/>
           <p:nvPr>
             <p:ph type="title"/>
@@ -9334,7 +9236,7 @@
         </p:spPr>
         <p:txBody>
           <a:bodyPr bIns="45700" rIns="91425" lIns="91425" tIns="45700" anchor="ctr" anchorCtr="0">
-            <a:normAutofit/>
+            <a:noAutofit/>
           </a:bodyPr>
           <a:lstStyle/>
           <a:p>
@@ -9366,7 +9268,7 @@
       </p:sp>
       <p:sp>
         <p:nvSpPr>
-          <p:cNvPr id="179" name="Shape 179"/>
+          <p:cNvPr id="178" name="Shape 178"/>
           <p:cNvSpPr txBox="1"/>
           <p:nvPr>
             <p:ph idx="1" type="body"/>
@@ -9387,7 +9289,7 @@
         </p:spPr>
         <p:txBody>
           <a:bodyPr bIns="45700" rIns="91425" lIns="91425" tIns="45700" anchor="t" anchorCtr="0">
-            <a:normAutofit/>
+            <a:noAutofit/>
           </a:bodyPr>
           <a:lstStyle/>
           <a:p>
@@ -9532,7 +9434,7 @@
   <p:cSld>
     <p:spTree>
       <p:nvGrpSpPr>
-        <p:cNvPr id="183" name="Shape 183"/>
+        <p:cNvPr id="182" name="Shape 182"/>
         <p:cNvGrpSpPr/>
         <p:nvPr/>
       </p:nvGrpSpPr>
@@ -9546,7 +9448,7 @@
       </p:grpSpPr>
       <p:sp>
         <p:nvSpPr>
-          <p:cNvPr id="184" name="Shape 184"/>
+          <p:cNvPr id="183" name="Shape 183"/>
           <p:cNvSpPr txBox="1"/>
           <p:nvPr>
             <p:ph type="title"/>
@@ -9563,7 +9465,7 @@
         </p:spPr>
         <p:txBody>
           <a:bodyPr bIns="91425" rIns="91425" lIns="91425" tIns="91425" anchor="ctr" anchorCtr="0">
-            <a:normAutofit/>
+            <a:noAutofit/>
           </a:bodyPr>
           <a:lstStyle/>
           <a:p>
@@ -9587,7 +9489,7 @@
       </p:sp>
       <p:pic>
         <p:nvPicPr>
-          <p:cNvPr id="185" name="Shape 185"/>
+          <p:cNvPr id="184" name="Shape 184"/>
           <p:cNvPicPr preferRelativeResize="0"/>
           <p:nvPr/>
         </p:nvPicPr>
@@ -9629,7 +9531,7 @@
   <p:cSld>
     <p:spTree>
       <p:nvGrpSpPr>
-        <p:cNvPr id="189" name="Shape 189"/>
+        <p:cNvPr id="188" name="Shape 188"/>
         <p:cNvGrpSpPr/>
         <p:nvPr/>
       </p:nvGrpSpPr>
@@ -9643,7 +9545,7 @@
       </p:grpSpPr>
       <p:sp>
         <p:nvSpPr>
-          <p:cNvPr id="190" name="Shape 190"/>
+          <p:cNvPr id="189" name="Shape 189"/>
           <p:cNvSpPr txBox="1"/>
           <p:nvPr>
             <p:ph type="title"/>
@@ -9660,7 +9562,7 @@
         </p:spPr>
         <p:txBody>
           <a:bodyPr bIns="91425" rIns="91425" lIns="91425" tIns="91425" anchor="ctr" anchorCtr="0">
-            <a:normAutofit/>
+            <a:noAutofit/>
           </a:bodyPr>
           <a:lstStyle/>
           <a:p>
@@ -9687,7 +9589,7 @@
       </p:sp>
       <p:sp>
         <p:nvSpPr>
-          <p:cNvPr id="191" name="Shape 191"/>
+          <p:cNvPr id="190" name="Shape 190"/>
           <p:cNvSpPr txBox="1"/>
           <p:nvPr>
             <p:ph idx="1" type="body"/>
@@ -9704,7 +9606,7 @@
         </p:spPr>
         <p:txBody>
           <a:bodyPr bIns="91425" rIns="91425" lIns="91425" tIns="91425" anchor="t" anchorCtr="0">
-            <a:normAutofit/>
+            <a:noAutofit/>
           </a:bodyPr>
           <a:lstStyle/>
           <a:p>
@@ -9875,7 +9777,7 @@
   <p:cSld>
     <p:spTree>
       <p:nvGrpSpPr>
-        <p:cNvPr id="195" name="Shape 195"/>
+        <p:cNvPr id="194" name="Shape 194"/>
         <p:cNvGrpSpPr/>
         <p:nvPr/>
       </p:nvGrpSpPr>
@@ -9889,7 +9791,7 @@
       </p:grpSpPr>
       <p:sp>
         <p:nvSpPr>
-          <p:cNvPr id="196" name="Shape 196"/>
+          <p:cNvPr id="195" name="Shape 195"/>
           <p:cNvSpPr txBox="1"/>
           <p:nvPr>
             <p:ph type="title"/>
@@ -9910,7 +9812,7 @@
         </p:spPr>
         <p:txBody>
           <a:bodyPr bIns="45700" rIns="91425" lIns="91425" tIns="45700" anchor="ctr" anchorCtr="0">
-            <a:normAutofit/>
+            <a:noAutofit/>
           </a:bodyPr>
           <a:lstStyle/>
           <a:p>
@@ -9942,7 +9844,7 @@
       </p:sp>
       <p:sp>
         <p:nvSpPr>
-          <p:cNvPr id="197" name="Shape 197"/>
+          <p:cNvPr id="196" name="Shape 196"/>
           <p:cNvSpPr txBox="1"/>
           <p:nvPr>
             <p:ph idx="1" type="body"/>
@@ -9963,7 +9865,7 @@
         </p:spPr>
         <p:txBody>
           <a:bodyPr bIns="45700" rIns="91425" lIns="91425" tIns="45700" anchor="t" anchorCtr="0">
-            <a:normAutofit/>
+            <a:noAutofit/>
           </a:bodyPr>
           <a:lstStyle/>
           <a:p>
@@ -10255,7 +10157,7 @@
   <p:cSld>
     <p:spTree>
       <p:nvGrpSpPr>
-        <p:cNvPr id="201" name="Shape 201"/>
+        <p:cNvPr id="200" name="Shape 200"/>
         <p:cNvGrpSpPr/>
         <p:nvPr/>
       </p:nvGrpSpPr>
@@ -10269,7 +10171,7 @@
       </p:grpSpPr>
       <p:sp>
         <p:nvSpPr>
-          <p:cNvPr id="202" name="Shape 202"/>
+          <p:cNvPr id="201" name="Shape 201"/>
           <p:cNvSpPr txBox="1"/>
           <p:nvPr>
             <p:ph type="title"/>
@@ -10290,7 +10192,7 @@
         </p:spPr>
         <p:txBody>
           <a:bodyPr bIns="45700" rIns="91425" lIns="91425" tIns="45700" anchor="ctr" anchorCtr="0">
-            <a:normAutofit/>
+            <a:noAutofit/>
           </a:bodyPr>
           <a:lstStyle/>
           <a:p>
@@ -10322,7 +10224,7 @@
       </p:sp>
       <p:sp>
         <p:nvSpPr>
-          <p:cNvPr id="203" name="Shape 203"/>
+          <p:cNvPr id="202" name="Shape 202"/>
           <p:cNvSpPr txBox="1"/>
           <p:nvPr>
             <p:ph idx="1" type="body"/>
@@ -10343,7 +10245,7 @@
         </p:spPr>
         <p:txBody>
           <a:bodyPr bIns="45700" rIns="91425" lIns="91425" tIns="45700" anchor="t" anchorCtr="0">
-            <a:normAutofit/>
+            <a:noAutofit/>
           </a:bodyPr>
           <a:lstStyle/>
           <a:p>
@@ -10384,7 +10286,7 @@
               <a:buChar char="•"/>
             </a:pPr>
             <a:r>
-              <a:rPr strike="noStrike" u="none" b="0" cap="none" baseline="0" sz="3200" lang="pt-BR" i="0">
+              <a:rPr lang="pt-BR">
                 <a:solidFill>
                   <a:schemeClr val="dk1"/>
                 </a:solidFill>
@@ -10393,32 +10295,7 @@
                 <a:cs typeface="Calibri"/>
                 <a:sym typeface="Calibri"/>
               </a:rPr>
-              <a:t>Rafael Vieira </a:t>
-            </a:r>
-          </a:p>
-          <a:p>
-            <a:pPr algn="l" rtl="0" lvl="0" marR="0" indent="-342900" marL="342900">
-              <a:spcBef>
-                <a:spcPts val="640"/>
-              </a:spcBef>
-              <a:buClr>
-                <a:schemeClr val="dk1"/>
-              </a:buClr>
-              <a:buSzPct val="100000"/>
-              <a:buFont typeface="Calibri"/>
-              <a:buChar char="•"/>
-            </a:pPr>
-            <a:r>
-              <a:rPr strike="noStrike" u="none" b="0" cap="none" baseline="0" sz="3200" lang="pt-BR" i="0">
-                <a:solidFill>
-                  <a:schemeClr val="dk1"/>
-                </a:solidFill>
-                <a:latin typeface="Calibri"/>
-                <a:ea typeface="Calibri"/>
-                <a:cs typeface="Calibri"/>
-                <a:sym typeface="Calibri"/>
-              </a:rPr>
-              <a:t>Rafael Vieira’s friend</a:t>
+              <a:t>Monitores de CG</a:t>
             </a:r>
           </a:p>
           <a:p>
@@ -10523,7 +10400,7 @@
         </p:spPr>
         <p:txBody>
           <a:bodyPr bIns="45700" rIns="91425" lIns="91425" tIns="45700" anchor="ctr" anchorCtr="0">
-            <a:normAutofit/>
+            <a:noAutofit/>
           </a:bodyPr>
           <a:lstStyle/>
           <a:p>
@@ -10576,7 +10453,7 @@
         </p:spPr>
         <p:txBody>
           <a:bodyPr bIns="45700" rIns="91425" lIns="91425" tIns="45700" anchor="t" anchorCtr="0">
-            <a:normAutofit/>
+            <a:noAutofit/>
           </a:bodyPr>
           <a:lstStyle/>
           <a:p>
@@ -10657,7 +10534,7 @@
         </p:spPr>
         <p:txBody>
           <a:bodyPr bIns="45700" rIns="91425" lIns="91425" tIns="45700" anchor="ctr" anchorCtr="0">
-            <a:normAutofit/>
+            <a:noAutofit/>
           </a:bodyPr>
           <a:lstStyle/>
           <a:p>
@@ -10710,7 +10587,7 @@
         </p:spPr>
         <p:txBody>
           <a:bodyPr bIns="45700" rIns="91425" lIns="91425" tIns="45700" anchor="t" anchorCtr="0">
-            <a:normAutofit/>
+            <a:noAutofit/>
           </a:bodyPr>
           <a:lstStyle/>
           <a:p>
@@ -10891,7 +10768,7 @@
         </p:spPr>
         <p:txBody>
           <a:bodyPr bIns="45700" rIns="91425" lIns="91425" tIns="45700" anchor="ctr" anchorCtr="0">
-            <a:normAutofit/>
+            <a:noAutofit/>
           </a:bodyPr>
           <a:lstStyle/>
           <a:p>
@@ -10944,7 +10821,7 @@
         </p:spPr>
         <p:txBody>
           <a:bodyPr bIns="45700" rIns="91425" lIns="91425" tIns="45700" anchor="t" anchorCtr="0">
-            <a:normAutofit/>
+            <a:noAutofit/>
           </a:bodyPr>
           <a:lstStyle/>
           <a:p>
@@ -11162,7 +11039,7 @@
         </p:spPr>
         <p:txBody>
           <a:bodyPr bIns="45700" rIns="91425" lIns="91425" tIns="45700" anchor="ctr" anchorCtr="0">
-            <a:normAutofit/>
+            <a:noAutofit/>
           </a:bodyPr>
           <a:lstStyle/>
           <a:p>
@@ -11267,7 +11144,7 @@
         </p:spPr>
         <p:txBody>
           <a:bodyPr bIns="91425" rIns="91425" lIns="91425" tIns="91425" anchor="b" anchorCtr="0">
-            <a:normAutofit/>
+            <a:noAutofit/>
           </a:bodyPr>
           <a:lstStyle/>
           <a:p>
@@ -11364,7 +11241,7 @@
         </p:spPr>
         <p:txBody>
           <a:bodyPr bIns="91425" rIns="91425" lIns="91425" tIns="91425" anchor="b" anchorCtr="0">
-            <a:normAutofit/>
+            <a:noAutofit/>
           </a:bodyPr>
           <a:lstStyle/>
           <a:p>
@@ -11489,7 +11366,7 @@
         </p:spPr>
         <p:txBody>
           <a:bodyPr bIns="91425" rIns="91425" lIns="91425" tIns="91425" anchor="b" anchorCtr="0">
-            <a:normAutofit/>
+            <a:noAutofit/>
           </a:bodyPr>
           <a:lstStyle/>
           <a:p>
@@ -11568,6 +11445,283 @@
 </file>
 
 <file path=ppt/theme/theme1.xml><?xml version="1.0" encoding="utf-8"?>
+<a:theme xmlns:a="http://schemas.openxmlformats.org/drawingml/2006/main" xmlns:r="http://schemas.openxmlformats.org/officeDocument/2006/relationships" name="Custom Theme">
+  <a:themeElements>
+    <a:clrScheme name="Default">
+      <a:dk1>
+        <a:srgbClr val="000000"/>
+      </a:dk1>
+      <a:lt1>
+        <a:srgbClr val="FFFFFF"/>
+      </a:lt1>
+      <a:dk2>
+        <a:srgbClr val="158158"/>
+      </a:dk2>
+      <a:lt2>
+        <a:srgbClr val="F3F3F3"/>
+      </a:lt2>
+      <a:accent1>
+        <a:srgbClr val="058DC7"/>
+      </a:accent1>
+      <a:accent2>
+        <a:srgbClr val="50B432"/>
+      </a:accent2>
+      <a:accent3>
+        <a:srgbClr val="ED561B"/>
+      </a:accent3>
+      <a:accent4>
+        <a:srgbClr val="EDEF00"/>
+      </a:accent4>
+      <a:accent5>
+        <a:srgbClr val="24CBE5"/>
+      </a:accent5>
+      <a:accent6>
+        <a:srgbClr val="64E572"/>
+      </a:accent6>
+      <a:hlink>
+        <a:srgbClr val="2200CC"/>
+      </a:hlink>
+      <a:folHlink>
+        <a:srgbClr val="551A8B"/>
+      </a:folHlink>
+    </a:clrScheme>
+    <a:fontScheme name="Office">
+      <a:majorFont>
+        <a:latin typeface="Arial"/>
+        <a:ea typeface=""/>
+        <a:cs typeface=""/>
+        <a:font typeface="ＭＳ Ｐゴシック" script="Jpan"/>
+        <a:font typeface="맑은 고딕" script="Hang"/>
+        <a:font typeface="宋体" script="Hans"/>
+        <a:font typeface="新細明體" script="Hant"/>
+        <a:font typeface="Times New Roman" script="Arab"/>
+        <a:font typeface="Times New Roman" script="Hebr"/>
+        <a:font typeface="Angsana New" script="Thai"/>
+        <a:font typeface="Nyala" script="Ethi"/>
+        <a:font typeface="Vrinda" script="Beng"/>
+        <a:font typeface="Shruti" script="Gujr"/>
+        <a:font typeface="MoolBoran" script="Khmr"/>
+        <a:font typeface="Tunga" script="Knda"/>
+        <a:font typeface="Raavi" script="Guru"/>
+        <a:font typeface="Euphemia" script="Cans"/>
+        <a:font typeface="Plantagenet Cherokee" script="Cher"/>
+        <a:font typeface="Microsoft Yi Baiti" script="Yiii"/>
+        <a:font typeface="Microsoft Himalaya" script="Tibt"/>
+        <a:font typeface="MV Boli" script="Thaa"/>
+        <a:font typeface="Mangal" script="Deva"/>
+        <a:font typeface="Gautami" script="Telu"/>
+        <a:font typeface="Latha" script="Taml"/>
+        <a:font typeface="Estrangelo Edessa" script="Syrc"/>
+        <a:font typeface="Kalinga" script="Orya"/>
+        <a:font typeface="Kartika" script="Mlym"/>
+        <a:font typeface="DokChampa" script="Laoo"/>
+        <a:font typeface="Iskoola Pota" script="Sinh"/>
+        <a:font typeface="Mongolian Baiti" script="Mong"/>
+        <a:font typeface="Times New Roman" script="Viet"/>
+        <a:font typeface="Microsoft Uighur" script="Uigh"/>
+      </a:majorFont>
+      <a:minorFont>
+        <a:latin typeface="Arial"/>
+        <a:ea typeface=""/>
+        <a:cs typeface=""/>
+        <a:font typeface="ＭＳ Ｐゴシック" script="Jpan"/>
+        <a:font typeface="맑은 고딕" script="Hang"/>
+        <a:font typeface="宋体" script="Hans"/>
+        <a:font typeface="新細明體" script="Hant"/>
+        <a:font typeface="Times New Roman" script="Arab"/>
+        <a:font typeface="Times New Roman" script="Hebr"/>
+        <a:font typeface="Angsana New" script="Thai"/>
+        <a:font typeface="Nyala" script="Ethi"/>
+        <a:font typeface="Vrinda" script="Beng"/>
+        <a:font typeface="Shruti" script="Gujr"/>
+        <a:font typeface="MoolBoran" script="Khmr"/>
+        <a:font typeface="Tunga" script="Knda"/>
+        <a:font typeface="Raavi" script="Guru"/>
+        <a:font typeface="Euphemia" script="Cans"/>
+        <a:font typeface="Plantagenet Cherokee" script="Cher"/>
+        <a:font typeface="Microsoft Yi Baiti" script="Yiii"/>
+        <a:font typeface="Microsoft Himalaya" script="Tibt"/>
+        <a:font typeface="MV Boli" script="Thaa"/>
+        <a:font typeface="Mangal" script="Deva"/>
+        <a:font typeface="Gautami" script="Telu"/>
+        <a:font typeface="Latha" script="Taml"/>
+        <a:font typeface="Estrangelo Edessa" script="Syrc"/>
+        <a:font typeface="Kalinga" script="Orya"/>
+        <a:font typeface="Kartika" script="Mlym"/>
+        <a:font typeface="DokChampa" script="Laoo"/>
+        <a:font typeface="Iskoola Pota" script="Sinh"/>
+        <a:font typeface="Mongolian Baiti" script="Mong"/>
+        <a:font typeface="Times New Roman" script="Viet"/>
+        <a:font typeface="Microsoft Uighur" script="Uigh"/>
+      </a:minorFont>
+    </a:fontScheme>
+    <a:fmtScheme name="Office">
+      <a:fillStyleLst>
+        <a:solidFill>
+          <a:schemeClr val="phClr"/>
+        </a:solidFill>
+        <a:gradFill rotWithShape="1">
+          <a:gsLst>
+            <a:gs pos="0">
+              <a:schemeClr val="phClr">
+                <a:tint val="50000"/>
+                <a:satMod val="300000"/>
+              </a:schemeClr>
+            </a:gs>
+            <a:gs pos="35000">
+              <a:schemeClr val="phClr">
+                <a:tint val="37000"/>
+                <a:satMod val="300000"/>
+              </a:schemeClr>
+            </a:gs>
+            <a:gs pos="100000">
+              <a:schemeClr val="phClr">
+                <a:tint val="15000"/>
+                <a:satMod val="350000"/>
+              </a:schemeClr>
+            </a:gs>
+          </a:gsLst>
+          <a:lin ang="16200000" scaled="1"/>
+        </a:gradFill>
+        <a:gradFill rotWithShape="1">
+          <a:gsLst>
+            <a:gs pos="0">
+              <a:schemeClr val="phClr">
+                <a:tint val="100000"/>
+                <a:shade val="100000"/>
+                <a:satMod val="130000"/>
+              </a:schemeClr>
+            </a:gs>
+            <a:gs pos="100000">
+              <a:schemeClr val="phClr">
+                <a:tint val="50000"/>
+                <a:shade val="100000"/>
+                <a:satMod val="350000"/>
+              </a:schemeClr>
+            </a:gs>
+          </a:gsLst>
+          <a:lin ang="16200000" scaled="0"/>
+        </a:gradFill>
+      </a:fillStyleLst>
+      <a:lnStyleLst>
+        <a:ln w="9525" algn="ctr" cap="flat" cmpd="sng">
+          <a:solidFill>
+            <a:schemeClr val="phClr">
+              <a:shade val="95000"/>
+              <a:satMod val="105000"/>
+            </a:schemeClr>
+          </a:solidFill>
+          <a:prstDash val="solid"/>
+        </a:ln>
+        <a:ln w="25400" algn="ctr" cap="flat" cmpd="sng">
+          <a:solidFill>
+            <a:schemeClr val="phClr"/>
+          </a:solidFill>
+          <a:prstDash val="solid"/>
+        </a:ln>
+        <a:ln w="38100" algn="ctr" cap="flat" cmpd="sng">
+          <a:solidFill>
+            <a:schemeClr val="phClr"/>
+          </a:solidFill>
+          <a:prstDash val="solid"/>
+        </a:ln>
+      </a:lnStyleLst>
+      <a:effectStyleLst>
+        <a:effectStyle>
+          <a:effectLst>
+            <a:outerShdw rotWithShape="0" dir="5400000" blurRad="40000" dist="20000">
+              <a:srgbClr val="000000">
+                <a:alpha val="38000"/>
+              </a:srgbClr>
+            </a:outerShdw>
+          </a:effectLst>
+        </a:effectStyle>
+        <a:effectStyle>
+          <a:effectLst>
+            <a:outerShdw rotWithShape="0" dir="5400000" blurRad="40000" dist="23000">
+              <a:srgbClr val="000000">
+                <a:alpha val="35000"/>
+              </a:srgbClr>
+            </a:outerShdw>
+          </a:effectLst>
+        </a:effectStyle>
+        <a:effectStyle>
+          <a:effectLst>
+            <a:outerShdw rotWithShape="0" dir="5400000" blurRad="40000" dist="23000">
+              <a:srgbClr val="000000">
+                <a:alpha val="35000"/>
+              </a:srgbClr>
+            </a:outerShdw>
+          </a:effectLst>
+          <a:scene3d>
+            <a:camera prst="orthographicFront">
+              <a:rot rev="0" lon="0" lat="0"/>
+            </a:camera>
+            <a:lightRig dir="t" rig="threePt">
+              <a:rot rev="1200000" lon="0" lat="0"/>
+            </a:lightRig>
+          </a:scene3d>
+          <a:sp3d>
+            <a:bevelT w="63500" h="25400"/>
+          </a:sp3d>
+        </a:effectStyle>
+      </a:effectStyleLst>
+      <a:bgFillStyleLst>
+        <a:solidFill>
+          <a:schemeClr val="phClr"/>
+        </a:solidFill>
+        <a:gradFill rotWithShape="1">
+          <a:gsLst>
+            <a:gs pos="0">
+              <a:schemeClr val="phClr">
+                <a:tint val="40000"/>
+                <a:satMod val="350000"/>
+              </a:schemeClr>
+            </a:gs>
+            <a:gs pos="40000">
+              <a:schemeClr val="phClr">
+                <a:tint val="45000"/>
+                <a:shade val="99000"/>
+                <a:satMod val="350000"/>
+              </a:schemeClr>
+            </a:gs>
+            <a:gs pos="100000">
+              <a:schemeClr val="phClr">
+                <a:shade val="20000"/>
+                <a:satMod val="255000"/>
+              </a:schemeClr>
+            </a:gs>
+          </a:gsLst>
+          <a:path path="circle">
+            <a:fillToRect t="-80000" b="180000" r="50000" l="50000"/>
+          </a:path>
+        </a:gradFill>
+        <a:gradFill rotWithShape="1">
+          <a:gsLst>
+            <a:gs pos="0">
+              <a:schemeClr val="phClr">
+                <a:tint val="80000"/>
+                <a:satMod val="300000"/>
+              </a:schemeClr>
+            </a:gs>
+            <a:gs pos="100000">
+              <a:schemeClr val="phClr">
+                <a:shade val="30000"/>
+                <a:satMod val="200000"/>
+              </a:schemeClr>
+            </a:gs>
+          </a:gsLst>
+          <a:path path="circle">
+            <a:fillToRect t="50000" b="50000" r="50000" l="50000"/>
+          </a:path>
+        </a:gradFill>
+      </a:bgFillStyleLst>
+    </a:fmtScheme>
+  </a:themeElements>
+</a:theme>
+</file>
+
+<file path=ppt/theme/theme2.xml><?xml version="1.0" encoding="utf-8"?>
 <a:theme xmlns:a="http://schemas.openxmlformats.org/drawingml/2006/main" xmlns:r="http://schemas.openxmlformats.org/officeDocument/2006/relationships" name="Office Theme">
   <a:themeElements>
     <a:clrScheme name="Office">
@@ -11884,7 +12038,7 @@
 </a:theme>
 </file>
 
-<file path=ppt/theme/theme2.xml><?xml version="1.0" encoding="utf-8"?>
+<file path=ppt/theme/theme3.xml><?xml version="1.0" encoding="utf-8"?>
 <a:theme xmlns:a="http://schemas.openxmlformats.org/drawingml/2006/main" xmlns:r="http://schemas.openxmlformats.org/officeDocument/2006/relationships" name="wave">
   <a:themeElements>
     <a:clrScheme name="Custom 506">
@@ -12159,281 +12313,4 @@
     </a:fmtScheme>
   </a:themeElements>
 </a:theme>
-</file>
-
-<file path=ppt/theme/theme3.xml><?xml version="1.0" encoding="utf-8"?>
-<a:theme xmlns:a="http://schemas.openxmlformats.org/drawingml/2006/main" xmlns:r="http://schemas.openxmlformats.org/officeDocument/2006/relationships" name="Custom Theme">
-  <a:themeElements>
-    <a:clrScheme name="Default">
-      <a:dk1>
-        <a:srgbClr val="000000"/>
-      </a:dk1>
-      <a:lt1>
-        <a:srgbClr val="FFFFFF"/>
-      </a:lt1>
-      <a:dk2>
-        <a:srgbClr val="158158"/>
-      </a:dk2>
-      <a:lt2>
-        <a:srgbClr val="F3F3F3"/>
-      </a:lt2>
-      <a:accent1>
-        <a:srgbClr val="058DC7"/>
-      </a:accent1>
-      <a:accent2>
-        <a:srgbClr val="50B432"/>
-      </a:accent2>
-      <a:accent3>
-        <a:srgbClr val="ED561B"/>
-      </a:accent3>
-      <a:accent4>
-        <a:srgbClr val="EDEF00"/>
-      </a:accent4>
-      <a:accent5>
-        <a:srgbClr val="24CBE5"/>
-      </a:accent5>
-      <a:accent6>
-        <a:srgbClr val="64E572"/>
-      </a:accent6>
-      <a:hlink>
-        <a:srgbClr val="2200CC"/>
-      </a:hlink>
-      <a:folHlink>
-        <a:srgbClr val="551A8B"/>
-      </a:folHlink>
-    </a:clrScheme>
-    <a:fontScheme name="Office">
-      <a:majorFont>
-        <a:latin typeface="Arial"/>
-        <a:ea typeface=""/>
-        <a:cs typeface=""/>
-        <a:font typeface="ＭＳ Ｐゴシック" script="Jpan"/>
-        <a:font typeface="맑은 고딕" script="Hang"/>
-        <a:font typeface="宋体" script="Hans"/>
-        <a:font typeface="新細明體" script="Hant"/>
-        <a:font typeface="Times New Roman" script="Arab"/>
-        <a:font typeface="Times New Roman" script="Hebr"/>
-        <a:font typeface="Angsana New" script="Thai"/>
-        <a:font typeface="Nyala" script="Ethi"/>
-        <a:font typeface="Vrinda" script="Beng"/>
-        <a:font typeface="Shruti" script="Gujr"/>
-        <a:font typeface="MoolBoran" script="Khmr"/>
-        <a:font typeface="Tunga" script="Knda"/>
-        <a:font typeface="Raavi" script="Guru"/>
-        <a:font typeface="Euphemia" script="Cans"/>
-        <a:font typeface="Plantagenet Cherokee" script="Cher"/>
-        <a:font typeface="Microsoft Yi Baiti" script="Yiii"/>
-        <a:font typeface="Microsoft Himalaya" script="Tibt"/>
-        <a:font typeface="MV Boli" script="Thaa"/>
-        <a:font typeface="Mangal" script="Deva"/>
-        <a:font typeface="Gautami" script="Telu"/>
-        <a:font typeface="Latha" script="Taml"/>
-        <a:font typeface="Estrangelo Edessa" script="Syrc"/>
-        <a:font typeface="Kalinga" script="Orya"/>
-        <a:font typeface="Kartika" script="Mlym"/>
-        <a:font typeface="DokChampa" script="Laoo"/>
-        <a:font typeface="Iskoola Pota" script="Sinh"/>
-        <a:font typeface="Mongolian Baiti" script="Mong"/>
-        <a:font typeface="Times New Roman" script="Viet"/>
-        <a:font typeface="Microsoft Uighur" script="Uigh"/>
-      </a:majorFont>
-      <a:minorFont>
-        <a:latin typeface="Arial"/>
-        <a:ea typeface=""/>
-        <a:cs typeface=""/>
-        <a:font typeface="ＭＳ Ｐゴシック" script="Jpan"/>
-        <a:font typeface="맑은 고딕" script="Hang"/>
-        <a:font typeface="宋体" script="Hans"/>
-        <a:font typeface="新細明體" script="Hant"/>
-        <a:font typeface="Times New Roman" script="Arab"/>
-        <a:font typeface="Times New Roman" script="Hebr"/>
-        <a:font typeface="Angsana New" script="Thai"/>
-        <a:font typeface="Nyala" script="Ethi"/>
-        <a:font typeface="Vrinda" script="Beng"/>
-        <a:font typeface="Shruti" script="Gujr"/>
-        <a:font typeface="MoolBoran" script="Khmr"/>
-        <a:font typeface="Tunga" script="Knda"/>
-        <a:font typeface="Raavi" script="Guru"/>
-        <a:font typeface="Euphemia" script="Cans"/>
-        <a:font typeface="Plantagenet Cherokee" script="Cher"/>
-        <a:font typeface="Microsoft Yi Baiti" script="Yiii"/>
-        <a:font typeface="Microsoft Himalaya" script="Tibt"/>
-        <a:font typeface="MV Boli" script="Thaa"/>
-        <a:font typeface="Mangal" script="Deva"/>
-        <a:font typeface="Gautami" script="Telu"/>
-        <a:font typeface="Latha" script="Taml"/>
-        <a:font typeface="Estrangelo Edessa" script="Syrc"/>
-        <a:font typeface="Kalinga" script="Orya"/>
-        <a:font typeface="Kartika" script="Mlym"/>
-        <a:font typeface="DokChampa" script="Laoo"/>
-        <a:font typeface="Iskoola Pota" script="Sinh"/>
-        <a:font typeface="Mongolian Baiti" script="Mong"/>
-        <a:font typeface="Times New Roman" script="Viet"/>
-        <a:font typeface="Microsoft Uighur" script="Uigh"/>
-      </a:minorFont>
-    </a:fontScheme>
-    <a:fmtScheme name="Office">
-      <a:fillStyleLst>
-        <a:solidFill>
-          <a:schemeClr val="phClr"/>
-        </a:solidFill>
-        <a:gradFill rotWithShape="1">
-          <a:gsLst>
-            <a:gs pos="0">
-              <a:schemeClr val="phClr">
-                <a:tint val="50000"/>
-                <a:satMod val="300000"/>
-              </a:schemeClr>
-            </a:gs>
-            <a:gs pos="35000">
-              <a:schemeClr val="phClr">
-                <a:tint val="37000"/>
-                <a:satMod val="300000"/>
-              </a:schemeClr>
-            </a:gs>
-            <a:gs pos="100000">
-              <a:schemeClr val="phClr">
-                <a:tint val="15000"/>
-                <a:satMod val="350000"/>
-              </a:schemeClr>
-            </a:gs>
-          </a:gsLst>
-          <a:lin ang="16200000" scaled="1"/>
-        </a:gradFill>
-        <a:gradFill rotWithShape="1">
-          <a:gsLst>
-            <a:gs pos="0">
-              <a:schemeClr val="phClr">
-                <a:tint val="100000"/>
-                <a:shade val="100000"/>
-                <a:satMod val="130000"/>
-              </a:schemeClr>
-            </a:gs>
-            <a:gs pos="100000">
-              <a:schemeClr val="phClr">
-                <a:tint val="50000"/>
-                <a:shade val="100000"/>
-                <a:satMod val="350000"/>
-              </a:schemeClr>
-            </a:gs>
-          </a:gsLst>
-          <a:lin ang="16200000" scaled="0"/>
-        </a:gradFill>
-      </a:fillStyleLst>
-      <a:lnStyleLst>
-        <a:ln w="9525" algn="ctr" cap="flat" cmpd="sng">
-          <a:solidFill>
-            <a:schemeClr val="phClr">
-              <a:shade val="95000"/>
-              <a:satMod val="105000"/>
-            </a:schemeClr>
-          </a:solidFill>
-          <a:prstDash val="solid"/>
-        </a:ln>
-        <a:ln w="25400" algn="ctr" cap="flat" cmpd="sng">
-          <a:solidFill>
-            <a:schemeClr val="phClr"/>
-          </a:solidFill>
-          <a:prstDash val="solid"/>
-        </a:ln>
-        <a:ln w="38100" algn="ctr" cap="flat" cmpd="sng">
-          <a:solidFill>
-            <a:schemeClr val="phClr"/>
-          </a:solidFill>
-          <a:prstDash val="solid"/>
-        </a:ln>
-      </a:lnStyleLst>
-      <a:effectStyleLst>
-        <a:effectStyle>
-          <a:effectLst>
-            <a:outerShdw rotWithShape="0" dir="5400000" blurRad="40000" dist="20000">
-              <a:srgbClr val="000000">
-                <a:alpha val="38000"/>
-              </a:srgbClr>
-            </a:outerShdw>
-          </a:effectLst>
-        </a:effectStyle>
-        <a:effectStyle>
-          <a:effectLst>
-            <a:outerShdw rotWithShape="0" dir="5400000" blurRad="40000" dist="23000">
-              <a:srgbClr val="000000">
-                <a:alpha val="35000"/>
-              </a:srgbClr>
-            </a:outerShdw>
-          </a:effectLst>
-        </a:effectStyle>
-        <a:effectStyle>
-          <a:effectLst>
-            <a:outerShdw rotWithShape="0" dir="5400000" blurRad="40000" dist="23000">
-              <a:srgbClr val="000000">
-                <a:alpha val="35000"/>
-              </a:srgbClr>
-            </a:outerShdw>
-          </a:effectLst>
-          <a:scene3d>
-            <a:camera prst="orthographicFront">
-              <a:rot rev="0" lon="0" lat="0"/>
-            </a:camera>
-            <a:lightRig dir="t" rig="threePt">
-              <a:rot rev="1200000" lon="0" lat="0"/>
-            </a:lightRig>
-          </a:scene3d>
-          <a:sp3d>
-            <a:bevelT w="63500" h="25400"/>
-          </a:sp3d>
-        </a:effectStyle>
-      </a:effectStyleLst>
-      <a:bgFillStyleLst>
-        <a:solidFill>
-          <a:schemeClr val="phClr"/>
-        </a:solidFill>
-        <a:gradFill rotWithShape="1">
-          <a:gsLst>
-            <a:gs pos="0">
-              <a:schemeClr val="phClr">
-                <a:tint val="40000"/>
-                <a:satMod val="350000"/>
-              </a:schemeClr>
-            </a:gs>
-            <a:gs pos="40000">
-              <a:schemeClr val="phClr">
-                <a:tint val="45000"/>
-                <a:shade val="99000"/>
-                <a:satMod val="350000"/>
-              </a:schemeClr>
-            </a:gs>
-            <a:gs pos="100000">
-              <a:schemeClr val="phClr">
-                <a:shade val="20000"/>
-                <a:satMod val="255000"/>
-              </a:schemeClr>
-            </a:gs>
-          </a:gsLst>
-          <a:path path="circle">
-            <a:fillToRect t="-80000" b="180000" r="50000" l="50000"/>
-          </a:path>
-        </a:gradFill>
-        <a:gradFill rotWithShape="1">
-          <a:gsLst>
-            <a:gs pos="0">
-              <a:schemeClr val="phClr">
-                <a:tint val="80000"/>
-                <a:satMod val="300000"/>
-              </a:schemeClr>
-            </a:gs>
-            <a:gs pos="100000">
-              <a:schemeClr val="phClr">
-                <a:shade val="30000"/>
-                <a:satMod val="200000"/>
-              </a:schemeClr>
-            </a:gs>
-          </a:gsLst>
-          <a:path path="circle">
-            <a:fillToRect t="50000" b="50000" r="50000" l="50000"/>
-          </a:path>
-        </a:gradFill>
-      </a:bgFillStyleLst>
-    </a:fmtScheme>
-  </a:themeElements>
-</a:theme>
 </file>
</xml_diff>